<commit_message>
Commit #4 - Updating Result Without Time Difference
</commit_message>
<xml_diff>
--- a/Research/Research Progress.pptx
+++ b/Research/Research Progress.pptx
@@ -309,7 +309,7 @@
             <a:fld id="{87DE6118-2437-4B30-8E3C-4D2BE6020583}" type="datetimeFigureOut">
               <a:rPr lang="en-US"/>
               <a:pPr/>
-              <a:t>9/12/23</a:t>
+              <a:t>9/13/23</a:t>
             </a:fld>
             <a:endParaRPr lang="en-US" dirty="0"/>
           </a:p>
@@ -635,7 +635,7 @@
           <a:p>
             <a:fld id="{87DE6118-2437-4B30-8E3C-4D2BE6020583}" type="datetimeFigureOut">
               <a:rPr lang="en-US"/>
-              <a:t>9/12/23</a:t>
+              <a:t>9/13/23</a:t>
             </a:fld>
             <a:endParaRPr lang="en-US" dirty="0"/>
           </a:p>
@@ -810,7 +810,7 @@
           <a:p>
             <a:fld id="{87DE6118-2437-4B30-8E3C-4D2BE6020583}" type="datetimeFigureOut">
               <a:rPr lang="en-US"/>
-              <a:t>9/12/23</a:t>
+              <a:t>9/13/23</a:t>
             </a:fld>
             <a:endParaRPr lang="en-US" dirty="0"/>
           </a:p>
@@ -975,7 +975,7 @@
           <a:p>
             <a:fld id="{87DE6118-2437-4B30-8E3C-4D2BE6020583}" type="datetimeFigureOut">
               <a:rPr lang="en-US"/>
-              <a:t>9/12/23</a:t>
+              <a:t>9/13/23</a:t>
             </a:fld>
             <a:endParaRPr lang="en-US" dirty="0"/>
           </a:p>
@@ -1248,7 +1248,7 @@
             <a:fld id="{87DE6118-2437-4B30-8E3C-4D2BE6020583}" type="datetimeFigureOut">
               <a:rPr lang="en-US"/>
               <a:pPr/>
-              <a:t>9/12/23</a:t>
+              <a:t>9/13/23</a:t>
             </a:fld>
             <a:endParaRPr lang="en-US" dirty="0"/>
           </a:p>
@@ -1638,7 +1638,7 @@
           <a:p>
             <a:fld id="{87DE6118-2437-4B30-8E3C-4D2BE6020583}" type="datetimeFigureOut">
               <a:rPr lang="en-US"/>
-              <a:t>9/12/23</a:t>
+              <a:t>9/13/23</a:t>
             </a:fld>
             <a:endParaRPr lang="en-US" dirty="0"/>
           </a:p>
@@ -2110,7 +2110,7 @@
           <a:p>
             <a:fld id="{87DE6118-2437-4B30-8E3C-4D2BE6020583}" type="datetimeFigureOut">
               <a:rPr lang="en-US"/>
-              <a:t>9/12/23</a:t>
+              <a:t>9/13/23</a:t>
             </a:fld>
             <a:endParaRPr lang="en-US" dirty="0"/>
           </a:p>
@@ -2223,7 +2223,7 @@
           <a:p>
             <a:fld id="{87DE6118-2437-4B30-8E3C-4D2BE6020583}" type="datetimeFigureOut">
               <a:rPr lang="en-US"/>
-              <a:t>9/12/23</a:t>
+              <a:t>9/13/23</a:t>
             </a:fld>
             <a:endParaRPr lang="en-US" dirty="0"/>
           </a:p>
@@ -2313,7 +2313,7 @@
           <a:p>
             <a:fld id="{87DE6118-2437-4B30-8E3C-4D2BE6020583}" type="datetimeFigureOut">
               <a:rPr lang="en-US"/>
-              <a:t>9/12/23</a:t>
+              <a:t>9/13/23</a:t>
             </a:fld>
             <a:endParaRPr lang="en-US" dirty="0"/>
           </a:p>
@@ -2655,7 +2655,7 @@
             <a:fld id="{87DE6118-2437-4B30-8E3C-4D2BE6020583}" type="datetimeFigureOut">
               <a:rPr lang="en-US"/>
               <a:pPr/>
-              <a:t>9/12/23</a:t>
+              <a:t>9/13/23</a:t>
             </a:fld>
             <a:endParaRPr lang="en-US" dirty="0"/>
           </a:p>
@@ -3039,7 +3039,7 @@
             <a:fld id="{87DE6118-2437-4B30-8E3C-4D2BE6020583}" type="datetimeFigureOut">
               <a:rPr lang="en-US"/>
               <a:pPr/>
-              <a:t>9/12/23</a:t>
+              <a:t>9/13/23</a:t>
             </a:fld>
             <a:endParaRPr lang="en-US" dirty="0"/>
           </a:p>
@@ -3314,7 +3314,7 @@
             <a:fld id="{87DE6118-2437-4B30-8E3C-4D2BE6020583}" type="datetimeFigureOut">
               <a:rPr lang="en-US"/>
               <a:pPr/>
-              <a:t>9/12/23</a:t>
+              <a:t>9/13/23</a:t>
             </a:fld>
             <a:endParaRPr lang="en-US" dirty="0"/>
           </a:p>
@@ -11807,13 +11807,13 @@
         </p:nvSpPr>
         <p:spPr>
           <a:xfrm>
-            <a:off x="1371600" y="2286000"/>
+            <a:off x="1371600" y="1666240"/>
             <a:ext cx="9601200" cy="2703443"/>
           </a:xfrm>
         </p:spPr>
         <p:txBody>
           <a:bodyPr>
-            <a:normAutofit lnSpcReduction="10000"/>
+            <a:normAutofit fontScale="92500" lnSpcReduction="20000"/>
           </a:bodyPr>
           <a:lstStyle/>
           <a:p>
@@ -11890,22 +11890,34 @@
             </a:pPr>
             <a:r>
               <a:rPr lang="he-IL" dirty="0"/>
-              <a:t>התנסות חוזרת עם המודלים הקיימים (</a:t>
-            </a:r>
-            <a:r>
-              <a:rPr lang="he-IL" dirty="0" err="1"/>
+              <a:t>לאור מחקר חדש</a:t>
+            </a:r>
+            <a:r>
+              <a:rPr lang="en-US" dirty="0"/>
+              <a:t>,</a:t>
+            </a:r>
+            <a:r>
+              <a:rPr lang="he-IL" dirty="0"/>
+              <a:t> החלטנו לבצע התנסות חוזרת עם המודלים הקיימים (</a:t>
+            </a:r>
+            <a:r>
+              <a:rPr lang="he-IL" sz="1800" dirty="0"/>
               <a:t>L</a:t>
             </a:r>
             <a:r>
-              <a:rPr lang="en-US" dirty="0"/>
+              <a:rPr lang="en-US" sz="1800" dirty="0"/>
               <a:t>ST</a:t>
             </a:r>
             <a:r>
+              <a:rPr lang="he-IL" sz="1800" dirty="0"/>
+              <a:t>M </a:t>
+            </a:r>
+            <a:r>
               <a:rPr lang="he-IL" dirty="0"/>
-              <a:t>M ו-</a:t>
-            </a:r>
-            <a:r>
-              <a:rPr lang="en-US" dirty="0"/>
+              <a:t>ו-</a:t>
+            </a:r>
+            <a:r>
+              <a:rPr lang="en-US" sz="1800" dirty="0"/>
               <a:t>CNN</a:t>
             </a:r>
             <a:r>
@@ -11914,11 +11926,19 @@
             </a:r>
             <a:r>
               <a:rPr lang="en-US" dirty="0"/>
-              <a:t>,Time Difference</a:t>
+              <a:t>,</a:t>
+            </a:r>
+            <a:r>
+              <a:rPr lang="en-US" sz="1800" dirty="0"/>
+              <a:t>Time Difference</a:t>
+            </a:r>
+            <a:r>
+              <a:rPr lang="he-IL" sz="1800" dirty="0"/>
+              <a:t> </a:t>
             </a:r>
             <a:r>
               <a:rPr lang="he-IL" dirty="0"/>
-              <a:t> והפקת דוח סיווג כאשר בדקנו כל תרחיש ללא שלב לחיצת היד:</a:t>
+              <a:t>והפקת דוח סיווג כאשר בדקנו כל תרחיש ללא שלב לחיצת היד:</a:t>
             </a:r>
           </a:p>
           <a:p>
@@ -11928,15 +11948,15 @@
             </a:pPr>
             <a:r>
               <a:rPr lang="he-IL" dirty="0"/>
-              <a:t>סינון על פי כמות פאקטות: 50 / 100 / 150</a:t>
+              <a:t>סינון על פי כמות פאקטות: 50</a:t>
             </a:r>
             <a:r>
               <a:rPr lang="en-US" dirty="0"/>
-              <a:t> </a:t>
+              <a:t>/</a:t>
             </a:r>
             <a:r>
               <a:rPr lang="he-IL" dirty="0"/>
-              <a:t>/ 200</a:t>
+              <a:t> 100</a:t>
             </a:r>
             <a:r>
               <a:rPr lang="en-US" dirty="0"/>
@@ -11950,7 +11970,7 @@
             </a:pPr>
             <a:r>
               <a:rPr lang="he-IL" dirty="0"/>
-              <a:t>סינון על פי טווח זמנים: שנייה / 2 שניות / 3 שניות</a:t>
+              <a:t>סינון על פי טווח זמנים: שנייה / 2 שניות</a:t>
             </a:r>
             <a:r>
               <a:rPr lang="en-US" dirty="0"/>
@@ -11958,7 +11978,27 @@
             </a:r>
           </a:p>
           <a:p>
-            <a:pPr marL="384048" indent="-384048" algn="r" defTabSz="914400" rtl="1" eaLnBrk="1" latinLnBrk="0" hangingPunct="1">
+            <a:pPr marL="0" indent="0" algn="r" rtl="1">
+              <a:buNone/>
+            </a:pPr>
+            <a:r>
+              <a:rPr lang="he-IL" sz="1500" dirty="0"/>
+              <a:t>לא ראינו סיבה להמשיך כי לא הבחנו בשיפור ואף בחלק מהתוצאות בפגיעה בתוצאות</a:t>
+            </a:r>
+            <a:r>
+              <a:rPr lang="en-US" sz="1500" dirty="0"/>
+              <a:t>.</a:t>
+            </a:r>
+          </a:p>
+          <a:p>
+            <a:pPr marL="987552" lvl="1" indent="-457200" algn="r" rtl="1">
+              <a:buFont typeface="+mj-lt"/>
+              <a:buAutoNum type="arabicPeriod"/>
+            </a:pPr>
+            <a:endParaRPr lang="he-IL" dirty="0"/>
+          </a:p>
+          <a:p>
+            <a:pPr marL="0" indent="0" algn="r" defTabSz="914400" rtl="1" eaLnBrk="1" latinLnBrk="0" hangingPunct="1">
               <a:lnSpc>
                 <a:spcPct val="94000"/>
               </a:lnSpc>
@@ -11968,8 +12008,7 @@
               <a:spcAft>
                 <a:spcPts val="200"/>
               </a:spcAft>
-              <a:buFont typeface="Franklin Gothic Book" panose="020B0503020102020204" pitchFamily="34" charset="0"/>
-              <a:buChar char="■"/>
+              <a:buNone/>
             </a:pPr>
             <a:endParaRPr lang="en-US" dirty="0"/>
           </a:p>
@@ -12073,7 +12112,7 @@
         </p:blipFill>
         <p:spPr bwMode="auto">
           <a:xfrm>
-            <a:off x="7915141" y="3123639"/>
+            <a:off x="8138661" y="2320999"/>
             <a:ext cx="430369" cy="430369"/>
           </a:xfrm>
           <a:prstGeom prst="rect">
@@ -12283,56 +12322,6 @@
           </a:p>
         </p:txBody>
       </p:sp>
-      <p:pic>
-        <p:nvPicPr>
-          <p:cNvPr id="9" name="Picture 2">
-            <a:extLst>
-              <a:ext uri="{FF2B5EF4-FFF2-40B4-BE49-F238E27FC236}">
-                <a16:creationId xmlns:a16="http://schemas.microsoft.com/office/drawing/2014/main" id="{2D30E01F-C63C-BF55-0D6C-E5D0945A9FAC}"/>
-              </a:ext>
-            </a:extLst>
-          </p:cNvPr>
-          <p:cNvPicPr>
-            <a:picLocks noChangeAspect="1" noChangeArrowheads="1"/>
-          </p:cNvPicPr>
-          <p:nvPr/>
-        </p:nvPicPr>
-        <p:blipFill rotWithShape="1">
-          <a:blip r:embed="rId2">
-            <a:extLst>
-              <a:ext uri="{28A0092B-C50C-407E-A947-70E740481C1C}">
-                <a14:useLocalDpi xmlns:a14="http://schemas.microsoft.com/office/drawing/2010/main" val="0"/>
-              </a:ext>
-            </a:extLst>
-          </a:blip>
-          <a:srcRect t="54943" r="73688" b="1"/>
-          <a:stretch/>
-        </p:blipFill>
-        <p:spPr bwMode="auto">
-          <a:xfrm>
-            <a:off x="3812789" y="2713383"/>
-            <a:ext cx="4718822" cy="534477"/>
-          </a:xfrm>
-          <a:prstGeom prst="rect">
-            <a:avLst/>
-          </a:prstGeom>
-          <a:noFill/>
-          <a:ln>
-            <a:solidFill>
-              <a:schemeClr val="tx1"/>
-            </a:solidFill>
-          </a:ln>
-          <a:extLst>
-            <a:ext uri="{909E8E84-426E-40DD-AFC4-6F175D3DCCD1}">
-              <a14:hiddenFill xmlns:a14="http://schemas.microsoft.com/office/drawing/2010/main">
-                <a:solidFill>
-                  <a:srgbClr val="FFFFFF"/>
-                </a:solidFill>
-              </a14:hiddenFill>
-            </a:ext>
-          </a:extLst>
-        </p:spPr>
-      </p:pic>
       <p:sp>
         <p:nvSpPr>
           <p:cNvPr id="15" name="Content Placeholder 2">
@@ -12349,7 +12338,7 @@
         </p:nvSpPr>
         <p:spPr>
           <a:xfrm>
-            <a:off x="9273207" y="3402319"/>
+            <a:off x="9223662" y="4500213"/>
             <a:ext cx="1699591" cy="427383"/>
           </a:xfrm>
           <a:prstGeom prst="rect">
@@ -12564,293 +12553,12 @@
           </a:p>
         </p:txBody>
       </p:sp>
-      <p:pic>
-        <p:nvPicPr>
-          <p:cNvPr id="1028" name="Picture 4">
-            <a:extLst>
-              <a:ext uri="{FF2B5EF4-FFF2-40B4-BE49-F238E27FC236}">
-                <a16:creationId xmlns:a16="http://schemas.microsoft.com/office/drawing/2014/main" id="{28DA8BA2-1E6A-A4FE-7A83-E6A4B0742387}"/>
-              </a:ext>
-            </a:extLst>
-          </p:cNvPr>
-          <p:cNvPicPr>
-            <a:picLocks noChangeAspect="1" noChangeArrowheads="1"/>
-          </p:cNvPicPr>
-          <p:nvPr/>
-        </p:nvPicPr>
-        <p:blipFill rotWithShape="1">
-          <a:blip r:embed="rId3">
-            <a:extLst>
-              <a:ext uri="{28A0092B-C50C-407E-A947-70E740481C1C}">
-                <a14:useLocalDpi xmlns:a14="http://schemas.microsoft.com/office/drawing/2010/main" val="0"/>
-              </a:ext>
-            </a:extLst>
-          </a:blip>
-          <a:srcRect l="-1" t="15522" r="2670" b="8056"/>
-          <a:stretch/>
-        </p:blipFill>
-        <p:spPr bwMode="auto">
-          <a:xfrm>
-            <a:off x="3812789" y="3652141"/>
-            <a:ext cx="4718822" cy="572622"/>
-          </a:xfrm>
-          <a:prstGeom prst="rect">
-            <a:avLst/>
-          </a:prstGeom>
-          <a:noFill/>
-          <a:ln>
-            <a:solidFill>
-              <a:schemeClr val="tx1"/>
-            </a:solidFill>
-          </a:ln>
-          <a:extLst>
-            <a:ext uri="{909E8E84-426E-40DD-AFC4-6F175D3DCCD1}">
-              <a14:hiddenFill xmlns:a14="http://schemas.microsoft.com/office/drawing/2010/main">
-                <a:solidFill>
-                  <a:srgbClr val="FFFFFF"/>
-                </a:solidFill>
-              </a14:hiddenFill>
-            </a:ext>
-          </a:extLst>
-        </p:spPr>
-      </p:pic>
-      <p:sp>
-        <p:nvSpPr>
-          <p:cNvPr id="10" name="Content Placeholder 2">
-            <a:extLst>
-              <a:ext uri="{FF2B5EF4-FFF2-40B4-BE49-F238E27FC236}">
-                <a16:creationId xmlns:a16="http://schemas.microsoft.com/office/drawing/2014/main" id="{8BD6CC53-6BE9-3792-812B-B87A5C329BD6}"/>
-              </a:ext>
-            </a:extLst>
-          </p:cNvPr>
-          <p:cNvSpPr txBox="1">
-            <a:spLocks/>
-          </p:cNvSpPr>
-          <p:nvPr/>
-        </p:nvSpPr>
-        <p:spPr>
-          <a:xfrm>
-            <a:off x="9273208" y="4519748"/>
-            <a:ext cx="1699591" cy="427383"/>
-          </a:xfrm>
-          <a:prstGeom prst="rect">
-            <a:avLst/>
-          </a:prstGeom>
-        </p:spPr>
-        <p:txBody>
-          <a:bodyPr vert="horz" lIns="91440" tIns="45720" rIns="91440" bIns="45720" rtlCol="0">
-            <a:normAutofit fontScale="92500"/>
-          </a:bodyPr>
-          <a:lstStyle>
-            <a:lvl1pPr marL="384048" indent="-384048" algn="l" defTabSz="914400" rtl="0" eaLnBrk="1" latinLnBrk="0" hangingPunct="1">
-              <a:lnSpc>
-                <a:spcPct val="94000"/>
-              </a:lnSpc>
-              <a:spcBef>
-                <a:spcPts val="1000"/>
-              </a:spcBef>
-              <a:spcAft>
-                <a:spcPts val="200"/>
-              </a:spcAft>
-              <a:buFont typeface="Franklin Gothic Book" panose="020B0503020102020204" pitchFamily="34" charset="0"/>
-              <a:buChar char="■"/>
-              <a:defRPr sz="2000" kern="1200" baseline="0">
-                <a:solidFill>
-                  <a:schemeClr val="tx2"/>
-                </a:solidFill>
-                <a:latin typeface="+mn-lt"/>
-                <a:ea typeface="+mn-ea"/>
-                <a:cs typeface="+mn-cs"/>
-              </a:defRPr>
-            </a:lvl1pPr>
-            <a:lvl2pPr marL="914400" indent="-384048" algn="l" defTabSz="914400" rtl="0" eaLnBrk="1" latinLnBrk="0" hangingPunct="1">
-              <a:lnSpc>
-                <a:spcPct val="94000"/>
-              </a:lnSpc>
-              <a:spcBef>
-                <a:spcPts val="500"/>
-              </a:spcBef>
-              <a:spcAft>
-                <a:spcPts val="200"/>
-              </a:spcAft>
-              <a:buFont typeface="Franklin Gothic Book" panose="020B0503020102020204" pitchFamily="34" charset="0"/>
-              <a:buChar char="–"/>
-              <a:defRPr sz="2000" i="1" kern="1200" baseline="0">
-                <a:solidFill>
-                  <a:schemeClr val="tx2"/>
-                </a:solidFill>
-                <a:latin typeface="+mn-lt"/>
-                <a:ea typeface="+mn-ea"/>
-                <a:cs typeface="+mn-cs"/>
-              </a:defRPr>
-            </a:lvl2pPr>
-            <a:lvl3pPr marL="1371600" indent="-384048" algn="l" defTabSz="914400" rtl="0" eaLnBrk="1" latinLnBrk="0" hangingPunct="1">
-              <a:lnSpc>
-                <a:spcPct val="94000"/>
-              </a:lnSpc>
-              <a:spcBef>
-                <a:spcPts val="500"/>
-              </a:spcBef>
-              <a:spcAft>
-                <a:spcPts val="200"/>
-              </a:spcAft>
-              <a:buFont typeface="Franklin Gothic Book" panose="020B0503020102020204" pitchFamily="34" charset="0"/>
-              <a:buChar char="■"/>
-              <a:defRPr sz="1800" kern="1200" baseline="0">
-                <a:solidFill>
-                  <a:schemeClr val="tx2"/>
-                </a:solidFill>
-                <a:latin typeface="+mn-lt"/>
-                <a:ea typeface="+mn-ea"/>
-                <a:cs typeface="+mn-cs"/>
-              </a:defRPr>
-            </a:lvl3pPr>
-            <a:lvl4pPr marL="1828800" indent="-384048" algn="l" defTabSz="914400" rtl="0" eaLnBrk="1" latinLnBrk="0" hangingPunct="1">
-              <a:lnSpc>
-                <a:spcPct val="94000"/>
-              </a:lnSpc>
-              <a:spcBef>
-                <a:spcPts val="500"/>
-              </a:spcBef>
-              <a:spcAft>
-                <a:spcPts val="200"/>
-              </a:spcAft>
-              <a:buFont typeface="Franklin Gothic Book" panose="020B0503020102020204" pitchFamily="34" charset="0"/>
-              <a:buChar char="–"/>
-              <a:defRPr sz="1800" i="1" kern="1200" baseline="0">
-                <a:solidFill>
-                  <a:schemeClr val="tx2"/>
-                </a:solidFill>
-                <a:latin typeface="+mn-lt"/>
-                <a:ea typeface="+mn-ea"/>
-                <a:cs typeface="+mn-cs"/>
-              </a:defRPr>
-            </a:lvl4pPr>
-            <a:lvl5pPr marL="2286000" indent="-384048" algn="l" defTabSz="914400" rtl="0" eaLnBrk="1" latinLnBrk="0" hangingPunct="1">
-              <a:lnSpc>
-                <a:spcPct val="94000"/>
-              </a:lnSpc>
-              <a:spcBef>
-                <a:spcPts val="500"/>
-              </a:spcBef>
-              <a:spcAft>
-                <a:spcPts val="200"/>
-              </a:spcAft>
-              <a:buFont typeface="Franklin Gothic Book" panose="020B0503020102020204" pitchFamily="34" charset="0"/>
-              <a:buChar char="■"/>
-              <a:defRPr sz="1600" kern="1200" baseline="0">
-                <a:solidFill>
-                  <a:schemeClr val="tx2"/>
-                </a:solidFill>
-                <a:latin typeface="+mn-lt"/>
-                <a:ea typeface="+mn-ea"/>
-                <a:cs typeface="+mn-cs"/>
-              </a:defRPr>
-            </a:lvl5pPr>
-            <a:lvl6pPr marL="2743200" indent="-384048" algn="l" defTabSz="914400" rtl="0" eaLnBrk="1" latinLnBrk="0" hangingPunct="1">
-              <a:lnSpc>
-                <a:spcPct val="94000"/>
-              </a:lnSpc>
-              <a:spcBef>
-                <a:spcPts val="500"/>
-              </a:spcBef>
-              <a:spcAft>
-                <a:spcPts val="200"/>
-              </a:spcAft>
-              <a:buFont typeface="Franklin Gothic Book" panose="020B0503020102020204" pitchFamily="34" charset="0"/>
-              <a:buChar char="–"/>
-              <a:defRPr sz="1600" i="1" kern="1200" baseline="0">
-                <a:solidFill>
-                  <a:schemeClr val="tx2"/>
-                </a:solidFill>
-                <a:latin typeface="+mn-lt"/>
-                <a:ea typeface="+mn-ea"/>
-                <a:cs typeface="+mn-cs"/>
-              </a:defRPr>
-            </a:lvl6pPr>
-            <a:lvl7pPr marL="3200400" indent="-384048" algn="l" defTabSz="914400" rtl="0" eaLnBrk="1" latinLnBrk="0" hangingPunct="1">
-              <a:lnSpc>
-                <a:spcPct val="94000"/>
-              </a:lnSpc>
-              <a:spcBef>
-                <a:spcPts val="500"/>
-              </a:spcBef>
-              <a:spcAft>
-                <a:spcPts val="200"/>
-              </a:spcAft>
-              <a:buFont typeface="Franklin Gothic Book" panose="020B0503020102020204" pitchFamily="34" charset="0"/>
-              <a:buChar char="■"/>
-              <a:defRPr sz="1400" kern="1200" baseline="0">
-                <a:solidFill>
-                  <a:schemeClr val="tx2"/>
-                </a:solidFill>
-                <a:latin typeface="+mn-lt"/>
-                <a:ea typeface="+mn-ea"/>
-                <a:cs typeface="+mn-cs"/>
-              </a:defRPr>
-            </a:lvl7pPr>
-            <a:lvl8pPr marL="3657600" indent="-384048" algn="l" defTabSz="914400" rtl="0" eaLnBrk="1" latinLnBrk="0" hangingPunct="1">
-              <a:lnSpc>
-                <a:spcPct val="94000"/>
-              </a:lnSpc>
-              <a:spcBef>
-                <a:spcPts val="500"/>
-              </a:spcBef>
-              <a:spcAft>
-                <a:spcPts val="200"/>
-              </a:spcAft>
-              <a:buFont typeface="Franklin Gothic Book" panose="020B0503020102020204" pitchFamily="34" charset="0"/>
-              <a:buChar char="–"/>
-              <a:defRPr sz="1400" i="1" kern="1200" baseline="0">
-                <a:solidFill>
-                  <a:schemeClr val="tx2"/>
-                </a:solidFill>
-                <a:latin typeface="+mn-lt"/>
-                <a:ea typeface="+mn-ea"/>
-                <a:cs typeface="+mn-cs"/>
-              </a:defRPr>
-            </a:lvl8pPr>
-            <a:lvl9pPr marL="4114800" indent="-384048" algn="l" defTabSz="914400" rtl="0" eaLnBrk="1" latinLnBrk="0" hangingPunct="1">
-              <a:lnSpc>
-                <a:spcPct val="94000"/>
-              </a:lnSpc>
-              <a:spcBef>
-                <a:spcPts val="500"/>
-              </a:spcBef>
-              <a:spcAft>
-                <a:spcPts val="200"/>
-              </a:spcAft>
-              <a:buFont typeface="Franklin Gothic Book" panose="020B0503020102020204" pitchFamily="34" charset="0"/>
-              <a:buChar char="■"/>
-              <a:defRPr sz="1400" kern="1200" baseline="0">
-                <a:solidFill>
-                  <a:schemeClr val="tx2"/>
-                </a:solidFill>
-                <a:latin typeface="+mn-lt"/>
-                <a:ea typeface="+mn-ea"/>
-                <a:cs typeface="+mn-cs"/>
-              </a:defRPr>
-            </a:lvl9pPr>
-          </a:lstStyle>
-          <a:p>
-            <a:pPr algn="r" rtl="1">
-              <a:buFont typeface="Courier New" panose="02070309020205020404" pitchFamily="49" charset="0"/>
-              <a:buChar char="o"/>
-            </a:pPr>
-            <a:r>
-              <a:rPr lang="he-IL" dirty="0"/>
-              <a:t>150 פאקטות:</a:t>
-            </a:r>
-            <a:endParaRPr lang="en-IL" dirty="0"/>
-          </a:p>
-        </p:txBody>
-      </p:sp>
-      <p:sp>
-        <p:nvSpPr>
-          <p:cNvPr id="14" name="Right Brace 13">
-            <a:extLst>
-              <a:ext uri="{FF2B5EF4-FFF2-40B4-BE49-F238E27FC236}">
-                <a16:creationId xmlns:a16="http://schemas.microsoft.com/office/drawing/2014/main" id="{4299637A-EFCF-A9E3-8DEE-615CFA04B3D3}"/>
+      <p:sp>
+        <p:nvSpPr>
+          <p:cNvPr id="5" name="Right Brace 4">
+            <a:extLst>
+              <a:ext uri="{FF2B5EF4-FFF2-40B4-BE49-F238E27FC236}">
+                <a16:creationId xmlns:a16="http://schemas.microsoft.com/office/drawing/2014/main" id="{A1BB583B-8B19-35FE-0986-48055CB806A0}"/>
               </a:ext>
             </a:extLst>
           </p:cNvPr>
@@ -12860,7 +12568,7 @@
         <p:spPr>
           <a:xfrm>
             <a:off x="10923253" y="2314966"/>
-            <a:ext cx="457200" cy="3197560"/>
+            <a:ext cx="457200" cy="4309354"/>
           </a:xfrm>
           <a:prstGeom prst="rightBrace">
             <a:avLst/>
@@ -12889,62 +12597,12 @@
           </a:p>
         </p:txBody>
       </p:sp>
-      <p:pic>
-        <p:nvPicPr>
-          <p:cNvPr id="3074" name="Picture 2">
-            <a:extLst>
-              <a:ext uri="{FF2B5EF4-FFF2-40B4-BE49-F238E27FC236}">
-                <a16:creationId xmlns:a16="http://schemas.microsoft.com/office/drawing/2014/main" id="{FE60990C-8C07-BC7F-ABC3-DA2901D15BF1}"/>
-              </a:ext>
-            </a:extLst>
-          </p:cNvPr>
-          <p:cNvPicPr>
-            <a:picLocks noChangeAspect="1" noChangeArrowheads="1"/>
-          </p:cNvPicPr>
-          <p:nvPr/>
-        </p:nvPicPr>
-        <p:blipFill rotWithShape="1">
-          <a:blip r:embed="rId4">
-            <a:extLst>
-              <a:ext uri="{28A0092B-C50C-407E-A947-70E740481C1C}">
-                <a14:useLocalDpi xmlns:a14="http://schemas.microsoft.com/office/drawing/2010/main" val="0"/>
-              </a:ext>
-            </a:extLst>
-          </a:blip>
-          <a:srcRect l="3456" t="15794" b="20719"/>
-          <a:stretch/>
-        </p:blipFill>
-        <p:spPr bwMode="auto">
-          <a:xfrm>
-            <a:off x="3812789" y="4733439"/>
-            <a:ext cx="4718822" cy="571417"/>
-          </a:xfrm>
-          <a:prstGeom prst="rect">
-            <a:avLst/>
-          </a:prstGeom>
-          <a:noFill/>
-          <a:ln>
-            <a:solidFill>
-              <a:schemeClr val="tx1"/>
-            </a:solidFill>
-          </a:ln>
-          <a:extLst>
-            <a:ext uri="{909E8E84-426E-40DD-AFC4-6F175D3DCCD1}">
-              <a14:hiddenFill xmlns:a14="http://schemas.microsoft.com/office/drawing/2010/main">
-                <a:solidFill>
-                  <a:srgbClr val="FFFFFF"/>
-                </a:solidFill>
-              </a14:hiddenFill>
-            </a:ext>
-          </a:extLst>
-        </p:spPr>
-      </p:pic>
-      <p:sp>
-        <p:nvSpPr>
-          <p:cNvPr id="4" name="Rectangle 3">
-            <a:extLst>
-              <a:ext uri="{FF2B5EF4-FFF2-40B4-BE49-F238E27FC236}">
-                <a16:creationId xmlns:a16="http://schemas.microsoft.com/office/drawing/2014/main" id="{C5986E78-5D2F-A4D0-7921-50A8B350C0DA}"/>
+      <p:sp>
+        <p:nvSpPr>
+          <p:cNvPr id="7" name="Rectangle 6">
+            <a:extLst>
+              <a:ext uri="{FF2B5EF4-FFF2-40B4-BE49-F238E27FC236}">
+                <a16:creationId xmlns:a16="http://schemas.microsoft.com/office/drawing/2014/main" id="{AC4D66CB-8882-CA7F-D894-112CCD09707E}"/>
               </a:ext>
             </a:extLst>
           </p:cNvPr>
@@ -12953,7 +12611,7 @@
         </p:nvSpPr>
         <p:spPr>
           <a:xfrm>
-            <a:off x="11272629" y="3723008"/>
+            <a:off x="11272629" y="4272276"/>
             <a:ext cx="919371" cy="430887"/>
           </a:xfrm>
           <a:prstGeom prst="rect">
@@ -13109,6 +12767,125 @@
           </a:p>
         </p:txBody>
       </p:sp>
+      <p:pic>
+        <p:nvPicPr>
+          <p:cNvPr id="19" name="Picture 18">
+            <a:extLst>
+              <a:ext uri="{FF2B5EF4-FFF2-40B4-BE49-F238E27FC236}">
+                <a16:creationId xmlns:a16="http://schemas.microsoft.com/office/drawing/2014/main" id="{705C53D6-1060-8E99-5F32-DCA37CA9DE7B}"/>
+              </a:ext>
+            </a:extLst>
+          </p:cNvPr>
+          <p:cNvPicPr>
+            <a:picLocks noChangeAspect="1"/>
+          </p:cNvPicPr>
+          <p:nvPr/>
+        </p:nvPicPr>
+        <p:blipFill rotWithShape="1">
+          <a:blip r:embed="rId2"/>
+          <a:srcRect t="1" b="7015"/>
+          <a:stretch/>
+        </p:blipFill>
+        <p:spPr>
+          <a:xfrm>
+            <a:off x="3715252" y="2333167"/>
+            <a:ext cx="3982719" cy="307782"/>
+          </a:xfrm>
+          <a:prstGeom prst="rect">
+            <a:avLst/>
+          </a:prstGeom>
+        </p:spPr>
+      </p:pic>
+      <p:pic>
+        <p:nvPicPr>
+          <p:cNvPr id="21" name="Picture 20" descr="A screenshot of a computer screen&#10;&#10;Description automatically generated">
+            <a:extLst>
+              <a:ext uri="{FF2B5EF4-FFF2-40B4-BE49-F238E27FC236}">
+                <a16:creationId xmlns:a16="http://schemas.microsoft.com/office/drawing/2014/main" id="{9AD331A9-E6CE-EA28-6B50-54FCFFDA6EB2}"/>
+              </a:ext>
+            </a:extLst>
+          </p:cNvPr>
+          <p:cNvPicPr>
+            <a:picLocks noChangeAspect="1"/>
+          </p:cNvPicPr>
+          <p:nvPr/>
+        </p:nvPicPr>
+        <p:blipFill>
+          <a:blip r:embed="rId3"/>
+          <a:stretch>
+            <a:fillRect/>
+          </a:stretch>
+        </p:blipFill>
+        <p:spPr>
+          <a:xfrm>
+            <a:off x="3715251" y="2727548"/>
+            <a:ext cx="3982719" cy="1518866"/>
+          </a:xfrm>
+          <a:prstGeom prst="rect">
+            <a:avLst/>
+          </a:prstGeom>
+        </p:spPr>
+      </p:pic>
+      <p:pic>
+        <p:nvPicPr>
+          <p:cNvPr id="23" name="Picture 22">
+            <a:extLst>
+              <a:ext uri="{FF2B5EF4-FFF2-40B4-BE49-F238E27FC236}">
+                <a16:creationId xmlns:a16="http://schemas.microsoft.com/office/drawing/2014/main" id="{A1ACA6D4-8B5D-5F56-D22F-844DCCEB0C36}"/>
+              </a:ext>
+            </a:extLst>
+          </p:cNvPr>
+          <p:cNvPicPr>
+            <a:picLocks noChangeAspect="1"/>
+          </p:cNvPicPr>
+          <p:nvPr/>
+        </p:nvPicPr>
+        <p:blipFill>
+          <a:blip r:embed="rId4"/>
+          <a:stretch>
+            <a:fillRect/>
+          </a:stretch>
+        </p:blipFill>
+        <p:spPr>
+          <a:xfrm>
+            <a:off x="3715250" y="4521842"/>
+            <a:ext cx="3982719" cy="301395"/>
+          </a:xfrm>
+          <a:prstGeom prst="rect">
+            <a:avLst/>
+          </a:prstGeom>
+        </p:spPr>
+      </p:pic>
+      <p:pic>
+        <p:nvPicPr>
+          <p:cNvPr id="25" name="Picture 24">
+            <a:extLst>
+              <a:ext uri="{FF2B5EF4-FFF2-40B4-BE49-F238E27FC236}">
+                <a16:creationId xmlns:a16="http://schemas.microsoft.com/office/drawing/2014/main" id="{15793CB5-B7E2-FB69-9C52-4332E5B7A297}"/>
+              </a:ext>
+            </a:extLst>
+          </p:cNvPr>
+          <p:cNvPicPr>
+            <a:picLocks noChangeAspect="1"/>
+          </p:cNvPicPr>
+          <p:nvPr/>
+        </p:nvPicPr>
+        <p:blipFill>
+          <a:blip r:embed="rId5"/>
+          <a:stretch>
+            <a:fillRect/>
+          </a:stretch>
+        </p:blipFill>
+        <p:spPr>
+          <a:xfrm>
+            <a:off x="3715249" y="4927596"/>
+            <a:ext cx="3982719" cy="1609596"/>
+          </a:xfrm>
+          <a:prstGeom prst="rect">
+            <a:avLst/>
+          </a:prstGeom>
+        </p:spPr>
+      </p:pic>
     </p:spTree>
     <p:extLst>
       <p:ext uri="{BB962C8B-B14F-4D97-AF65-F5344CB8AC3E}">
@@ -13256,35 +13033,6 @@
           </a:p>
         </p:txBody>
       </p:sp>
-      <p:pic>
-        <p:nvPicPr>
-          <p:cNvPr id="8" name="Picture 7" descr="A black background with white numbers&#10;&#10;Description automatically generated">
-            <a:extLst>
-              <a:ext uri="{FF2B5EF4-FFF2-40B4-BE49-F238E27FC236}">
-                <a16:creationId xmlns:a16="http://schemas.microsoft.com/office/drawing/2014/main" id="{0798012D-2C7A-B525-CDEC-BBCA12AB5A1E}"/>
-              </a:ext>
-            </a:extLst>
-          </p:cNvPr>
-          <p:cNvPicPr>
-            <a:picLocks noChangeAspect="1"/>
-          </p:cNvPicPr>
-          <p:nvPr/>
-        </p:nvPicPr>
-        <p:blipFill rotWithShape="1">
-          <a:blip r:embed="rId2"/>
-          <a:srcRect b="11523"/>
-          <a:stretch/>
-        </p:blipFill>
-        <p:spPr>
-          <a:xfrm>
-            <a:off x="3736589" y="2499691"/>
-            <a:ext cx="4718822" cy="534823"/>
-          </a:xfrm>
-          <a:prstGeom prst="rect">
-            <a:avLst/>
-          </a:prstGeom>
-        </p:spPr>
-      </p:pic>
       <p:sp>
         <p:nvSpPr>
           <p:cNvPr id="10" name="Content Placeholder 2">
@@ -13301,7 +13049,7 @@
         </p:nvSpPr>
         <p:spPr>
           <a:xfrm>
-            <a:off x="9273206" y="3327123"/>
+            <a:off x="9261910" y="4480556"/>
             <a:ext cx="1699591" cy="427383"/>
           </a:xfrm>
           <a:prstGeom prst="rect">
@@ -13512,307 +13260,16 @@
               <a:rPr lang="he-IL" dirty="0"/>
               <a:t>2 שניות:</a:t>
             </a:r>
-            <a:endParaRPr lang="en-IL"/>
-          </a:p>
-        </p:txBody>
-      </p:sp>
-      <p:sp>
-        <p:nvSpPr>
-          <p:cNvPr id="11" name="Content Placeholder 2">
-            <a:extLst>
-              <a:ext uri="{FF2B5EF4-FFF2-40B4-BE49-F238E27FC236}">
-                <a16:creationId xmlns:a16="http://schemas.microsoft.com/office/drawing/2014/main" id="{BD323D73-D934-3B8A-97D9-1525641968EE}"/>
-              </a:ext>
-            </a:extLst>
-          </p:cNvPr>
-          <p:cNvSpPr txBox="1">
-            <a:spLocks/>
-          </p:cNvSpPr>
-          <p:nvPr/>
-        </p:nvSpPr>
-        <p:spPr>
-          <a:xfrm>
-            <a:off x="9273206" y="4368246"/>
-            <a:ext cx="1699591" cy="427383"/>
-          </a:xfrm>
-          <a:prstGeom prst="rect">
-            <a:avLst/>
-          </a:prstGeom>
-        </p:spPr>
-        <p:txBody>
-          <a:bodyPr vert="horz" lIns="91440" tIns="45720" rIns="91440" bIns="45720" rtlCol="0">
-            <a:normAutofit/>
-          </a:bodyPr>
-          <a:lstStyle>
-            <a:lvl1pPr marL="384048" indent="-384048" algn="l" defTabSz="914400" rtl="0" eaLnBrk="1" latinLnBrk="0" hangingPunct="1">
-              <a:lnSpc>
-                <a:spcPct val="94000"/>
-              </a:lnSpc>
-              <a:spcBef>
-                <a:spcPts val="1000"/>
-              </a:spcBef>
-              <a:spcAft>
-                <a:spcPts val="200"/>
-              </a:spcAft>
-              <a:buFont typeface="Franklin Gothic Book" panose="020B0503020102020204" pitchFamily="34" charset="0"/>
-              <a:buChar char="■"/>
-              <a:defRPr sz="2000" kern="1200" baseline="0">
-                <a:solidFill>
-                  <a:schemeClr val="tx2"/>
-                </a:solidFill>
-                <a:latin typeface="+mn-lt"/>
-                <a:ea typeface="+mn-ea"/>
-                <a:cs typeface="+mn-cs"/>
-              </a:defRPr>
-            </a:lvl1pPr>
-            <a:lvl2pPr marL="914400" indent="-384048" algn="l" defTabSz="914400" rtl="0" eaLnBrk="1" latinLnBrk="0" hangingPunct="1">
-              <a:lnSpc>
-                <a:spcPct val="94000"/>
-              </a:lnSpc>
-              <a:spcBef>
-                <a:spcPts val="500"/>
-              </a:spcBef>
-              <a:spcAft>
-                <a:spcPts val="200"/>
-              </a:spcAft>
-              <a:buFont typeface="Franklin Gothic Book" panose="020B0503020102020204" pitchFamily="34" charset="0"/>
-              <a:buChar char="–"/>
-              <a:defRPr sz="2000" i="1" kern="1200" baseline="0">
-                <a:solidFill>
-                  <a:schemeClr val="tx2"/>
-                </a:solidFill>
-                <a:latin typeface="+mn-lt"/>
-                <a:ea typeface="+mn-ea"/>
-                <a:cs typeface="+mn-cs"/>
-              </a:defRPr>
-            </a:lvl2pPr>
-            <a:lvl3pPr marL="1371600" indent="-384048" algn="l" defTabSz="914400" rtl="0" eaLnBrk="1" latinLnBrk="0" hangingPunct="1">
-              <a:lnSpc>
-                <a:spcPct val="94000"/>
-              </a:lnSpc>
-              <a:spcBef>
-                <a:spcPts val="500"/>
-              </a:spcBef>
-              <a:spcAft>
-                <a:spcPts val="200"/>
-              </a:spcAft>
-              <a:buFont typeface="Franklin Gothic Book" panose="020B0503020102020204" pitchFamily="34" charset="0"/>
-              <a:buChar char="■"/>
-              <a:defRPr sz="1800" kern="1200" baseline="0">
-                <a:solidFill>
-                  <a:schemeClr val="tx2"/>
-                </a:solidFill>
-                <a:latin typeface="+mn-lt"/>
-                <a:ea typeface="+mn-ea"/>
-                <a:cs typeface="+mn-cs"/>
-              </a:defRPr>
-            </a:lvl3pPr>
-            <a:lvl4pPr marL="1828800" indent="-384048" algn="l" defTabSz="914400" rtl="0" eaLnBrk="1" latinLnBrk="0" hangingPunct="1">
-              <a:lnSpc>
-                <a:spcPct val="94000"/>
-              </a:lnSpc>
-              <a:spcBef>
-                <a:spcPts val="500"/>
-              </a:spcBef>
-              <a:spcAft>
-                <a:spcPts val="200"/>
-              </a:spcAft>
-              <a:buFont typeface="Franklin Gothic Book" panose="020B0503020102020204" pitchFamily="34" charset="0"/>
-              <a:buChar char="–"/>
-              <a:defRPr sz="1800" i="1" kern="1200" baseline="0">
-                <a:solidFill>
-                  <a:schemeClr val="tx2"/>
-                </a:solidFill>
-                <a:latin typeface="+mn-lt"/>
-                <a:ea typeface="+mn-ea"/>
-                <a:cs typeface="+mn-cs"/>
-              </a:defRPr>
-            </a:lvl4pPr>
-            <a:lvl5pPr marL="2286000" indent="-384048" algn="l" defTabSz="914400" rtl="0" eaLnBrk="1" latinLnBrk="0" hangingPunct="1">
-              <a:lnSpc>
-                <a:spcPct val="94000"/>
-              </a:lnSpc>
-              <a:spcBef>
-                <a:spcPts val="500"/>
-              </a:spcBef>
-              <a:spcAft>
-                <a:spcPts val="200"/>
-              </a:spcAft>
-              <a:buFont typeface="Franklin Gothic Book" panose="020B0503020102020204" pitchFamily="34" charset="0"/>
-              <a:buChar char="■"/>
-              <a:defRPr sz="1600" kern="1200" baseline="0">
-                <a:solidFill>
-                  <a:schemeClr val="tx2"/>
-                </a:solidFill>
-                <a:latin typeface="+mn-lt"/>
-                <a:ea typeface="+mn-ea"/>
-                <a:cs typeface="+mn-cs"/>
-              </a:defRPr>
-            </a:lvl5pPr>
-            <a:lvl6pPr marL="2743200" indent="-384048" algn="l" defTabSz="914400" rtl="0" eaLnBrk="1" latinLnBrk="0" hangingPunct="1">
-              <a:lnSpc>
-                <a:spcPct val="94000"/>
-              </a:lnSpc>
-              <a:spcBef>
-                <a:spcPts val="500"/>
-              </a:spcBef>
-              <a:spcAft>
-                <a:spcPts val="200"/>
-              </a:spcAft>
-              <a:buFont typeface="Franklin Gothic Book" panose="020B0503020102020204" pitchFamily="34" charset="0"/>
-              <a:buChar char="–"/>
-              <a:defRPr sz="1600" i="1" kern="1200" baseline="0">
-                <a:solidFill>
-                  <a:schemeClr val="tx2"/>
-                </a:solidFill>
-                <a:latin typeface="+mn-lt"/>
-                <a:ea typeface="+mn-ea"/>
-                <a:cs typeface="+mn-cs"/>
-              </a:defRPr>
-            </a:lvl6pPr>
-            <a:lvl7pPr marL="3200400" indent="-384048" algn="l" defTabSz="914400" rtl="0" eaLnBrk="1" latinLnBrk="0" hangingPunct="1">
-              <a:lnSpc>
-                <a:spcPct val="94000"/>
-              </a:lnSpc>
-              <a:spcBef>
-                <a:spcPts val="500"/>
-              </a:spcBef>
-              <a:spcAft>
-                <a:spcPts val="200"/>
-              </a:spcAft>
-              <a:buFont typeface="Franklin Gothic Book" panose="020B0503020102020204" pitchFamily="34" charset="0"/>
-              <a:buChar char="■"/>
-              <a:defRPr sz="1400" kern="1200" baseline="0">
-                <a:solidFill>
-                  <a:schemeClr val="tx2"/>
-                </a:solidFill>
-                <a:latin typeface="+mn-lt"/>
-                <a:ea typeface="+mn-ea"/>
-                <a:cs typeface="+mn-cs"/>
-              </a:defRPr>
-            </a:lvl7pPr>
-            <a:lvl8pPr marL="3657600" indent="-384048" algn="l" defTabSz="914400" rtl="0" eaLnBrk="1" latinLnBrk="0" hangingPunct="1">
-              <a:lnSpc>
-                <a:spcPct val="94000"/>
-              </a:lnSpc>
-              <a:spcBef>
-                <a:spcPts val="500"/>
-              </a:spcBef>
-              <a:spcAft>
-                <a:spcPts val="200"/>
-              </a:spcAft>
-              <a:buFont typeface="Franklin Gothic Book" panose="020B0503020102020204" pitchFamily="34" charset="0"/>
-              <a:buChar char="–"/>
-              <a:defRPr sz="1400" i="1" kern="1200" baseline="0">
-                <a:solidFill>
-                  <a:schemeClr val="tx2"/>
-                </a:solidFill>
-                <a:latin typeface="+mn-lt"/>
-                <a:ea typeface="+mn-ea"/>
-                <a:cs typeface="+mn-cs"/>
-              </a:defRPr>
-            </a:lvl8pPr>
-            <a:lvl9pPr marL="4114800" indent="-384048" algn="l" defTabSz="914400" rtl="0" eaLnBrk="1" latinLnBrk="0" hangingPunct="1">
-              <a:lnSpc>
-                <a:spcPct val="94000"/>
-              </a:lnSpc>
-              <a:spcBef>
-                <a:spcPts val="500"/>
-              </a:spcBef>
-              <a:spcAft>
-                <a:spcPts val="200"/>
-              </a:spcAft>
-              <a:buFont typeface="Franklin Gothic Book" panose="020B0503020102020204" pitchFamily="34" charset="0"/>
-              <a:buChar char="■"/>
-              <a:defRPr sz="1400" kern="1200" baseline="0">
-                <a:solidFill>
-                  <a:schemeClr val="tx2"/>
-                </a:solidFill>
-                <a:latin typeface="+mn-lt"/>
-                <a:ea typeface="+mn-ea"/>
-                <a:cs typeface="+mn-cs"/>
-              </a:defRPr>
-            </a:lvl9pPr>
-          </a:lstStyle>
-          <a:p>
-            <a:pPr algn="r" rtl="1">
-              <a:buFont typeface="Courier New" panose="02070309020205020404" pitchFamily="49" charset="0"/>
-              <a:buChar char="o"/>
-            </a:pPr>
-            <a:r>
-              <a:rPr lang="he-IL" dirty="0"/>
-              <a:t>3 שניות:</a:t>
-            </a:r>
-            <a:endParaRPr lang="en-IL"/>
-          </a:p>
-        </p:txBody>
-      </p:sp>
-      <p:pic>
-        <p:nvPicPr>
-          <p:cNvPr id="13" name="Picture 12" descr="A black background with white numbers&#10;&#10;Description automatically generated">
-            <a:extLst>
-              <a:ext uri="{FF2B5EF4-FFF2-40B4-BE49-F238E27FC236}">
-                <a16:creationId xmlns:a16="http://schemas.microsoft.com/office/drawing/2014/main" id="{5F2C0998-4319-0C8F-5041-91A2153D0509}"/>
-              </a:ext>
-            </a:extLst>
-          </p:cNvPr>
-          <p:cNvPicPr>
-            <a:picLocks noChangeAspect="1"/>
-          </p:cNvPicPr>
-          <p:nvPr/>
-        </p:nvPicPr>
-        <p:blipFill>
-          <a:blip r:embed="rId3"/>
-          <a:stretch>
-            <a:fillRect/>
-          </a:stretch>
-        </p:blipFill>
-        <p:spPr>
-          <a:xfrm>
-            <a:off x="3736589" y="3642691"/>
-            <a:ext cx="4718822" cy="534822"/>
-          </a:xfrm>
-          <a:prstGeom prst="rect">
-            <a:avLst/>
-          </a:prstGeom>
-        </p:spPr>
-      </p:pic>
-      <p:pic>
-        <p:nvPicPr>
-          <p:cNvPr id="16" name="Picture 15" descr="A number on a black background&#10;&#10;Description automatically generated">
-            <a:extLst>
-              <a:ext uri="{FF2B5EF4-FFF2-40B4-BE49-F238E27FC236}">
-                <a16:creationId xmlns:a16="http://schemas.microsoft.com/office/drawing/2014/main" id="{1A363580-5D94-BF0E-8665-61139F00568A}"/>
-              </a:ext>
-            </a:extLst>
-          </p:cNvPr>
-          <p:cNvPicPr>
-            <a:picLocks noChangeAspect="1"/>
-          </p:cNvPicPr>
-          <p:nvPr/>
-        </p:nvPicPr>
-        <p:blipFill>
-          <a:blip r:embed="rId4"/>
-          <a:stretch>
-            <a:fillRect/>
-          </a:stretch>
-        </p:blipFill>
-        <p:spPr>
-          <a:xfrm>
-            <a:off x="3736590" y="4785690"/>
-            <a:ext cx="4718821" cy="549582"/>
-          </a:xfrm>
-          <a:prstGeom prst="rect">
-            <a:avLst/>
-          </a:prstGeom>
-        </p:spPr>
-      </p:pic>
-      <p:sp>
-        <p:nvSpPr>
-          <p:cNvPr id="4" name="Right Brace 3">
-            <a:extLst>
-              <a:ext uri="{FF2B5EF4-FFF2-40B4-BE49-F238E27FC236}">
-                <a16:creationId xmlns:a16="http://schemas.microsoft.com/office/drawing/2014/main" id="{737656AE-5F4B-D801-3FB5-B3A8203B0398}"/>
+            <a:endParaRPr lang="en-IL" dirty="0"/>
+          </a:p>
+        </p:txBody>
+      </p:sp>
+      <p:sp>
+        <p:nvSpPr>
+          <p:cNvPr id="2" name="Right Brace 1">
+            <a:extLst>
+              <a:ext uri="{FF2B5EF4-FFF2-40B4-BE49-F238E27FC236}">
+                <a16:creationId xmlns:a16="http://schemas.microsoft.com/office/drawing/2014/main" id="{2DD28830-F0F7-E046-3EE9-AF118589E878}"/>
               </a:ext>
             </a:extLst>
           </p:cNvPr>
@@ -13822,7 +13279,7 @@
         <p:spPr>
           <a:xfrm>
             <a:off x="10923253" y="2314966"/>
-            <a:ext cx="457200" cy="3197560"/>
+            <a:ext cx="457200" cy="4309354"/>
           </a:xfrm>
           <a:prstGeom prst="rightBrace">
             <a:avLst/>
@@ -13853,10 +13310,10 @@
       </p:sp>
       <p:sp>
         <p:nvSpPr>
-          <p:cNvPr id="5" name="Rectangle 4">
-            <a:extLst>
-              <a:ext uri="{FF2B5EF4-FFF2-40B4-BE49-F238E27FC236}">
-                <a16:creationId xmlns:a16="http://schemas.microsoft.com/office/drawing/2014/main" id="{749CF8A3-592C-88B5-ED6D-B97EE2362170}"/>
+          <p:cNvPr id="7" name="Rectangle 6">
+            <a:extLst>
+              <a:ext uri="{FF2B5EF4-FFF2-40B4-BE49-F238E27FC236}">
+                <a16:creationId xmlns:a16="http://schemas.microsoft.com/office/drawing/2014/main" id="{8780D5A7-36A7-D2F2-7C23-F97E7E9913F7}"/>
               </a:ext>
             </a:extLst>
           </p:cNvPr>
@@ -13865,7 +13322,7 @@
         </p:nvSpPr>
         <p:spPr>
           <a:xfrm>
-            <a:off x="11272629" y="3719389"/>
+            <a:off x="11272629" y="4272276"/>
             <a:ext cx="919371" cy="430887"/>
           </a:xfrm>
           <a:prstGeom prst="rect">
@@ -14021,6 +13478,125 @@
           </a:p>
         </p:txBody>
       </p:sp>
+      <p:pic>
+        <p:nvPicPr>
+          <p:cNvPr id="5" name="Picture 4">
+            <a:extLst>
+              <a:ext uri="{FF2B5EF4-FFF2-40B4-BE49-F238E27FC236}">
+                <a16:creationId xmlns:a16="http://schemas.microsoft.com/office/drawing/2014/main" id="{90CFF47A-08B9-598F-1D76-D67ACB88375D}"/>
+              </a:ext>
+            </a:extLst>
+          </p:cNvPr>
+          <p:cNvPicPr>
+            <a:picLocks noChangeAspect="1"/>
+          </p:cNvPicPr>
+          <p:nvPr/>
+        </p:nvPicPr>
+        <p:blipFill rotWithShape="1">
+          <a:blip r:embed="rId2"/>
+          <a:srcRect t="7500" r="943"/>
+          <a:stretch/>
+        </p:blipFill>
+        <p:spPr>
+          <a:xfrm>
+            <a:off x="3715252" y="2306320"/>
+            <a:ext cx="3982720" cy="320785"/>
+          </a:xfrm>
+          <a:prstGeom prst="rect">
+            <a:avLst/>
+          </a:prstGeom>
+        </p:spPr>
+      </p:pic>
+      <p:pic>
+        <p:nvPicPr>
+          <p:cNvPr id="12" name="Picture 11" descr="A screenshot of a computer screen&#10;&#10;Description automatically generated">
+            <a:extLst>
+              <a:ext uri="{FF2B5EF4-FFF2-40B4-BE49-F238E27FC236}">
+                <a16:creationId xmlns:a16="http://schemas.microsoft.com/office/drawing/2014/main" id="{A2989B3E-7281-6645-FAA3-48CCA5DA4F06}"/>
+              </a:ext>
+            </a:extLst>
+          </p:cNvPr>
+          <p:cNvPicPr>
+            <a:picLocks noChangeAspect="1"/>
+          </p:cNvPicPr>
+          <p:nvPr/>
+        </p:nvPicPr>
+        <p:blipFill>
+          <a:blip r:embed="rId3"/>
+          <a:stretch>
+            <a:fillRect/>
+          </a:stretch>
+        </p:blipFill>
+        <p:spPr>
+          <a:xfrm>
+            <a:off x="3715252" y="2713383"/>
+            <a:ext cx="3982720" cy="1576493"/>
+          </a:xfrm>
+          <a:prstGeom prst="rect">
+            <a:avLst/>
+          </a:prstGeom>
+        </p:spPr>
+      </p:pic>
+      <p:pic>
+        <p:nvPicPr>
+          <p:cNvPr id="14" name="Picture 13">
+            <a:extLst>
+              <a:ext uri="{FF2B5EF4-FFF2-40B4-BE49-F238E27FC236}">
+                <a16:creationId xmlns:a16="http://schemas.microsoft.com/office/drawing/2014/main" id="{4B22E066-3003-4F36-1015-A79B79E34B56}"/>
+              </a:ext>
+            </a:extLst>
+          </p:cNvPr>
+          <p:cNvPicPr>
+            <a:picLocks noChangeAspect="1"/>
+          </p:cNvPicPr>
+          <p:nvPr/>
+        </p:nvPicPr>
+        <p:blipFill>
+          <a:blip r:embed="rId4"/>
+          <a:stretch>
+            <a:fillRect/>
+          </a:stretch>
+        </p:blipFill>
+        <p:spPr>
+          <a:xfrm>
+            <a:off x="3715251" y="4497879"/>
+            <a:ext cx="3982719" cy="320784"/>
+          </a:xfrm>
+          <a:prstGeom prst="rect">
+            <a:avLst/>
+          </a:prstGeom>
+        </p:spPr>
+      </p:pic>
+      <p:pic>
+        <p:nvPicPr>
+          <p:cNvPr id="18" name="Picture 17" descr="A screenshot of a computer screen&#10;&#10;Description automatically generated">
+            <a:extLst>
+              <a:ext uri="{FF2B5EF4-FFF2-40B4-BE49-F238E27FC236}">
+                <a16:creationId xmlns:a16="http://schemas.microsoft.com/office/drawing/2014/main" id="{01F0F615-2D8C-5F6C-870F-321A3E752C0C}"/>
+              </a:ext>
+            </a:extLst>
+          </p:cNvPr>
+          <p:cNvPicPr>
+            <a:picLocks noChangeAspect="1"/>
+          </p:cNvPicPr>
+          <p:nvPr/>
+        </p:nvPicPr>
+        <p:blipFill>
+          <a:blip r:embed="rId5"/>
+          <a:stretch>
+            <a:fillRect/>
+          </a:stretch>
+        </p:blipFill>
+        <p:spPr>
+          <a:xfrm>
+            <a:off x="3715250" y="4897732"/>
+            <a:ext cx="3982719" cy="1624122"/>
+          </a:xfrm>
+          <a:prstGeom prst="rect">
+            <a:avLst/>
+          </a:prstGeom>
+        </p:spPr>
+      </p:pic>
     </p:spTree>
     <p:extLst>
       <p:ext uri="{BB962C8B-B14F-4D97-AF65-F5344CB8AC3E}">
@@ -14223,8 +13799,8 @@
         </p:nvSpPr>
         <p:spPr>
           <a:xfrm>
-            <a:off x="9273207" y="3429000"/>
-            <a:ext cx="1699591" cy="427383"/>
+            <a:off x="9226496" y="4500213"/>
+            <a:ext cx="1699591" cy="330863"/>
           </a:xfrm>
           <a:prstGeom prst="rect">
             <a:avLst/>
@@ -14232,7 +13808,7 @@
         </p:spPr>
         <p:txBody>
           <a:bodyPr vert="horz" lIns="91440" tIns="45720" rIns="91440" bIns="45720" rtlCol="0">
-            <a:normAutofit fontScale="92500"/>
+            <a:normAutofit fontScale="92500" lnSpcReduction="20000"/>
           </a:bodyPr>
           <a:lstStyle>
             <a:lvl1pPr marL="384048" indent="-384048" algn="l" defTabSz="914400" rtl="0" eaLnBrk="1" latinLnBrk="0" hangingPunct="1">
@@ -14438,56 +14014,6 @@
           </a:p>
         </p:txBody>
       </p:sp>
-      <p:pic>
-        <p:nvPicPr>
-          <p:cNvPr id="4100" name="Picture 4">
-            <a:extLst>
-              <a:ext uri="{FF2B5EF4-FFF2-40B4-BE49-F238E27FC236}">
-                <a16:creationId xmlns:a16="http://schemas.microsoft.com/office/drawing/2014/main" id="{461FD8CD-C355-B35F-E533-B8D00441D56D}"/>
-              </a:ext>
-            </a:extLst>
-          </p:cNvPr>
-          <p:cNvPicPr>
-            <a:picLocks noChangeAspect="1" noChangeArrowheads="1"/>
-          </p:cNvPicPr>
-          <p:nvPr/>
-        </p:nvPicPr>
-        <p:blipFill rotWithShape="1">
-          <a:blip r:embed="rId2">
-            <a:extLst>
-              <a:ext uri="{28A0092B-C50C-407E-A947-70E740481C1C}">
-                <a14:useLocalDpi xmlns:a14="http://schemas.microsoft.com/office/drawing/2010/main" val="0"/>
-              </a:ext>
-            </a:extLst>
-          </a:blip>
-          <a:srcRect t="23934" b="11324"/>
-          <a:stretch/>
-        </p:blipFill>
-        <p:spPr bwMode="auto">
-          <a:xfrm>
-            <a:off x="3812789" y="3693372"/>
-            <a:ext cx="4718822" cy="542667"/>
-          </a:xfrm>
-          <a:prstGeom prst="rect">
-            <a:avLst/>
-          </a:prstGeom>
-          <a:noFill/>
-          <a:ln>
-            <a:solidFill>
-              <a:schemeClr val="tx1"/>
-            </a:solidFill>
-          </a:ln>
-          <a:extLst>
-            <a:ext uri="{909E8E84-426E-40DD-AFC4-6F175D3DCCD1}">
-              <a14:hiddenFill xmlns:a14="http://schemas.microsoft.com/office/drawing/2010/main">
-                <a:solidFill>
-                  <a:srgbClr val="FFFFFF"/>
-                </a:solidFill>
-              </a14:hiddenFill>
-            </a:ext>
-          </a:extLst>
-        </p:spPr>
-      </p:pic>
       <p:sp>
         <p:nvSpPr>
           <p:cNvPr id="9" name="Right Brace 8">
@@ -14503,7 +14029,7 @@
         <p:spPr>
           <a:xfrm>
             <a:off x="10923253" y="2314966"/>
-            <a:ext cx="457200" cy="3197560"/>
+            <a:ext cx="457200" cy="4309354"/>
           </a:xfrm>
           <a:prstGeom prst="rightBrace">
             <a:avLst/>
@@ -14534,343 +14060,6 @@
       </p:sp>
       <p:sp>
         <p:nvSpPr>
-          <p:cNvPr id="10" name="Content Placeholder 2">
-            <a:extLst>
-              <a:ext uri="{FF2B5EF4-FFF2-40B4-BE49-F238E27FC236}">
-                <a16:creationId xmlns:a16="http://schemas.microsoft.com/office/drawing/2014/main" id="{1C05173A-C4F8-B7B2-226A-01D78B19F6A8}"/>
-              </a:ext>
-            </a:extLst>
-          </p:cNvPr>
-          <p:cNvSpPr txBox="1">
-            <a:spLocks/>
-          </p:cNvSpPr>
-          <p:nvPr/>
-        </p:nvSpPr>
-        <p:spPr>
-          <a:xfrm>
-            <a:off x="9261910" y="4518638"/>
-            <a:ext cx="1699591" cy="427383"/>
-          </a:xfrm>
-          <a:prstGeom prst="rect">
-            <a:avLst/>
-          </a:prstGeom>
-        </p:spPr>
-        <p:txBody>
-          <a:bodyPr vert="horz" lIns="91440" tIns="45720" rIns="91440" bIns="45720" rtlCol="0">
-            <a:normAutofit fontScale="92500"/>
-          </a:bodyPr>
-          <a:lstStyle>
-            <a:lvl1pPr marL="384048" indent="-384048" algn="l" defTabSz="914400" rtl="0" eaLnBrk="1" latinLnBrk="0" hangingPunct="1">
-              <a:lnSpc>
-                <a:spcPct val="94000"/>
-              </a:lnSpc>
-              <a:spcBef>
-                <a:spcPts val="1000"/>
-              </a:spcBef>
-              <a:spcAft>
-                <a:spcPts val="200"/>
-              </a:spcAft>
-              <a:buFont typeface="Franklin Gothic Book" panose="020B0503020102020204" pitchFamily="34" charset="0"/>
-              <a:buChar char="■"/>
-              <a:defRPr sz="2000" kern="1200" baseline="0">
-                <a:solidFill>
-                  <a:schemeClr val="tx2"/>
-                </a:solidFill>
-                <a:latin typeface="+mn-lt"/>
-                <a:ea typeface="+mn-ea"/>
-                <a:cs typeface="+mn-cs"/>
-              </a:defRPr>
-            </a:lvl1pPr>
-            <a:lvl2pPr marL="914400" indent="-384048" algn="l" defTabSz="914400" rtl="0" eaLnBrk="1" latinLnBrk="0" hangingPunct="1">
-              <a:lnSpc>
-                <a:spcPct val="94000"/>
-              </a:lnSpc>
-              <a:spcBef>
-                <a:spcPts val="500"/>
-              </a:spcBef>
-              <a:spcAft>
-                <a:spcPts val="200"/>
-              </a:spcAft>
-              <a:buFont typeface="Franklin Gothic Book" panose="020B0503020102020204" pitchFamily="34" charset="0"/>
-              <a:buChar char="–"/>
-              <a:defRPr sz="2000" i="1" kern="1200" baseline="0">
-                <a:solidFill>
-                  <a:schemeClr val="tx2"/>
-                </a:solidFill>
-                <a:latin typeface="+mn-lt"/>
-                <a:ea typeface="+mn-ea"/>
-                <a:cs typeface="+mn-cs"/>
-              </a:defRPr>
-            </a:lvl2pPr>
-            <a:lvl3pPr marL="1371600" indent="-384048" algn="l" defTabSz="914400" rtl="0" eaLnBrk="1" latinLnBrk="0" hangingPunct="1">
-              <a:lnSpc>
-                <a:spcPct val="94000"/>
-              </a:lnSpc>
-              <a:spcBef>
-                <a:spcPts val="500"/>
-              </a:spcBef>
-              <a:spcAft>
-                <a:spcPts val="200"/>
-              </a:spcAft>
-              <a:buFont typeface="Franklin Gothic Book" panose="020B0503020102020204" pitchFamily="34" charset="0"/>
-              <a:buChar char="■"/>
-              <a:defRPr sz="1800" kern="1200" baseline="0">
-                <a:solidFill>
-                  <a:schemeClr val="tx2"/>
-                </a:solidFill>
-                <a:latin typeface="+mn-lt"/>
-                <a:ea typeface="+mn-ea"/>
-                <a:cs typeface="+mn-cs"/>
-              </a:defRPr>
-            </a:lvl3pPr>
-            <a:lvl4pPr marL="1828800" indent="-384048" algn="l" defTabSz="914400" rtl="0" eaLnBrk="1" latinLnBrk="0" hangingPunct="1">
-              <a:lnSpc>
-                <a:spcPct val="94000"/>
-              </a:lnSpc>
-              <a:spcBef>
-                <a:spcPts val="500"/>
-              </a:spcBef>
-              <a:spcAft>
-                <a:spcPts val="200"/>
-              </a:spcAft>
-              <a:buFont typeface="Franklin Gothic Book" panose="020B0503020102020204" pitchFamily="34" charset="0"/>
-              <a:buChar char="–"/>
-              <a:defRPr sz="1800" i="1" kern="1200" baseline="0">
-                <a:solidFill>
-                  <a:schemeClr val="tx2"/>
-                </a:solidFill>
-                <a:latin typeface="+mn-lt"/>
-                <a:ea typeface="+mn-ea"/>
-                <a:cs typeface="+mn-cs"/>
-              </a:defRPr>
-            </a:lvl4pPr>
-            <a:lvl5pPr marL="2286000" indent="-384048" algn="l" defTabSz="914400" rtl="0" eaLnBrk="1" latinLnBrk="0" hangingPunct="1">
-              <a:lnSpc>
-                <a:spcPct val="94000"/>
-              </a:lnSpc>
-              <a:spcBef>
-                <a:spcPts val="500"/>
-              </a:spcBef>
-              <a:spcAft>
-                <a:spcPts val="200"/>
-              </a:spcAft>
-              <a:buFont typeface="Franklin Gothic Book" panose="020B0503020102020204" pitchFamily="34" charset="0"/>
-              <a:buChar char="■"/>
-              <a:defRPr sz="1600" kern="1200" baseline="0">
-                <a:solidFill>
-                  <a:schemeClr val="tx2"/>
-                </a:solidFill>
-                <a:latin typeface="+mn-lt"/>
-                <a:ea typeface="+mn-ea"/>
-                <a:cs typeface="+mn-cs"/>
-              </a:defRPr>
-            </a:lvl5pPr>
-            <a:lvl6pPr marL="2743200" indent="-384048" algn="l" defTabSz="914400" rtl="0" eaLnBrk="1" latinLnBrk="0" hangingPunct="1">
-              <a:lnSpc>
-                <a:spcPct val="94000"/>
-              </a:lnSpc>
-              <a:spcBef>
-                <a:spcPts val="500"/>
-              </a:spcBef>
-              <a:spcAft>
-                <a:spcPts val="200"/>
-              </a:spcAft>
-              <a:buFont typeface="Franklin Gothic Book" panose="020B0503020102020204" pitchFamily="34" charset="0"/>
-              <a:buChar char="–"/>
-              <a:defRPr sz="1600" i="1" kern="1200" baseline="0">
-                <a:solidFill>
-                  <a:schemeClr val="tx2"/>
-                </a:solidFill>
-                <a:latin typeface="+mn-lt"/>
-                <a:ea typeface="+mn-ea"/>
-                <a:cs typeface="+mn-cs"/>
-              </a:defRPr>
-            </a:lvl6pPr>
-            <a:lvl7pPr marL="3200400" indent="-384048" algn="l" defTabSz="914400" rtl="0" eaLnBrk="1" latinLnBrk="0" hangingPunct="1">
-              <a:lnSpc>
-                <a:spcPct val="94000"/>
-              </a:lnSpc>
-              <a:spcBef>
-                <a:spcPts val="500"/>
-              </a:spcBef>
-              <a:spcAft>
-                <a:spcPts val="200"/>
-              </a:spcAft>
-              <a:buFont typeface="Franklin Gothic Book" panose="020B0503020102020204" pitchFamily="34" charset="0"/>
-              <a:buChar char="■"/>
-              <a:defRPr sz="1400" kern="1200" baseline="0">
-                <a:solidFill>
-                  <a:schemeClr val="tx2"/>
-                </a:solidFill>
-                <a:latin typeface="+mn-lt"/>
-                <a:ea typeface="+mn-ea"/>
-                <a:cs typeface="+mn-cs"/>
-              </a:defRPr>
-            </a:lvl7pPr>
-            <a:lvl8pPr marL="3657600" indent="-384048" algn="l" defTabSz="914400" rtl="0" eaLnBrk="1" latinLnBrk="0" hangingPunct="1">
-              <a:lnSpc>
-                <a:spcPct val="94000"/>
-              </a:lnSpc>
-              <a:spcBef>
-                <a:spcPts val="500"/>
-              </a:spcBef>
-              <a:spcAft>
-                <a:spcPts val="200"/>
-              </a:spcAft>
-              <a:buFont typeface="Franklin Gothic Book" panose="020B0503020102020204" pitchFamily="34" charset="0"/>
-              <a:buChar char="–"/>
-              <a:defRPr sz="1400" i="1" kern="1200" baseline="0">
-                <a:solidFill>
-                  <a:schemeClr val="tx2"/>
-                </a:solidFill>
-                <a:latin typeface="+mn-lt"/>
-                <a:ea typeface="+mn-ea"/>
-                <a:cs typeface="+mn-cs"/>
-              </a:defRPr>
-            </a:lvl8pPr>
-            <a:lvl9pPr marL="4114800" indent="-384048" algn="l" defTabSz="914400" rtl="0" eaLnBrk="1" latinLnBrk="0" hangingPunct="1">
-              <a:lnSpc>
-                <a:spcPct val="94000"/>
-              </a:lnSpc>
-              <a:spcBef>
-                <a:spcPts val="500"/>
-              </a:spcBef>
-              <a:spcAft>
-                <a:spcPts val="200"/>
-              </a:spcAft>
-              <a:buFont typeface="Franklin Gothic Book" panose="020B0503020102020204" pitchFamily="34" charset="0"/>
-              <a:buChar char="■"/>
-              <a:defRPr sz="1400" kern="1200" baseline="0">
-                <a:solidFill>
-                  <a:schemeClr val="tx2"/>
-                </a:solidFill>
-                <a:latin typeface="+mn-lt"/>
-                <a:ea typeface="+mn-ea"/>
-                <a:cs typeface="+mn-cs"/>
-              </a:defRPr>
-            </a:lvl9pPr>
-          </a:lstStyle>
-          <a:p>
-            <a:pPr algn="r" rtl="1">
-              <a:buFont typeface="Courier New" panose="02070309020205020404" pitchFamily="49" charset="0"/>
-              <a:buChar char="o"/>
-            </a:pPr>
-            <a:r>
-              <a:rPr lang="he-IL" dirty="0"/>
-              <a:t>150 פאקטות:</a:t>
-            </a:r>
-            <a:endParaRPr lang="en-IL" dirty="0"/>
-          </a:p>
-        </p:txBody>
-      </p:sp>
-      <p:pic>
-        <p:nvPicPr>
-          <p:cNvPr id="1028" name="Picture 4">
-            <a:extLst>
-              <a:ext uri="{FF2B5EF4-FFF2-40B4-BE49-F238E27FC236}">
-                <a16:creationId xmlns:a16="http://schemas.microsoft.com/office/drawing/2014/main" id="{D43875D8-83E4-0FCC-A0F7-217119F53AD2}"/>
-              </a:ext>
-            </a:extLst>
-          </p:cNvPr>
-          <p:cNvPicPr>
-            <a:picLocks noChangeAspect="1" noChangeArrowheads="1"/>
-          </p:cNvPicPr>
-          <p:nvPr/>
-        </p:nvPicPr>
-        <p:blipFill rotWithShape="1">
-          <a:blip r:embed="rId3">
-            <a:extLst>
-              <a:ext uri="{28A0092B-C50C-407E-A947-70E740481C1C}">
-                <a14:useLocalDpi xmlns:a14="http://schemas.microsoft.com/office/drawing/2010/main" val="0"/>
-              </a:ext>
-            </a:extLst>
-          </a:blip>
-          <a:srcRect t="10903" r="1761" b="12794"/>
-          <a:stretch/>
-        </p:blipFill>
-        <p:spPr bwMode="auto">
-          <a:xfrm>
-            <a:off x="3812789" y="4674687"/>
-            <a:ext cx="4718822" cy="542667"/>
-          </a:xfrm>
-          <a:prstGeom prst="rect">
-            <a:avLst/>
-          </a:prstGeom>
-          <a:noFill/>
-          <a:ln>
-            <a:solidFill>
-              <a:schemeClr val="tx1">
-                <a:lumMod val="95000"/>
-                <a:lumOff val="5000"/>
-              </a:schemeClr>
-            </a:solidFill>
-          </a:ln>
-          <a:extLst>
-            <a:ext uri="{909E8E84-426E-40DD-AFC4-6F175D3DCCD1}">
-              <a14:hiddenFill xmlns:a14="http://schemas.microsoft.com/office/drawing/2010/main">
-                <a:solidFill>
-                  <a:srgbClr val="FFFFFF"/>
-                </a:solidFill>
-              </a14:hiddenFill>
-            </a:ext>
-          </a:extLst>
-        </p:spPr>
-      </p:pic>
-      <p:pic>
-        <p:nvPicPr>
-          <p:cNvPr id="1030" name="Picture 6">
-            <a:extLst>
-              <a:ext uri="{FF2B5EF4-FFF2-40B4-BE49-F238E27FC236}">
-                <a16:creationId xmlns:a16="http://schemas.microsoft.com/office/drawing/2014/main" id="{F677EB94-CA68-9C29-8AFD-0F3039B3DC3D}"/>
-              </a:ext>
-            </a:extLst>
-          </p:cNvPr>
-          <p:cNvPicPr>
-            <a:picLocks noChangeAspect="1" noChangeArrowheads="1"/>
-          </p:cNvPicPr>
-          <p:nvPr/>
-        </p:nvPicPr>
-        <p:blipFill rotWithShape="1">
-          <a:blip r:embed="rId4">
-            <a:extLst>
-              <a:ext uri="{28A0092B-C50C-407E-A947-70E740481C1C}">
-                <a14:useLocalDpi xmlns:a14="http://schemas.microsoft.com/office/drawing/2010/main" val="0"/>
-              </a:ext>
-            </a:extLst>
-          </a:blip>
-          <a:srcRect l="1" t="13451" r="333"/>
-          <a:stretch/>
-        </p:blipFill>
-        <p:spPr bwMode="auto">
-          <a:xfrm>
-            <a:off x="3812789" y="2712057"/>
-            <a:ext cx="4718822" cy="542667"/>
-          </a:xfrm>
-          <a:prstGeom prst="rect">
-            <a:avLst/>
-          </a:prstGeom>
-          <a:noFill/>
-          <a:ln>
-            <a:solidFill>
-              <a:schemeClr val="tx1">
-                <a:lumMod val="95000"/>
-                <a:lumOff val="5000"/>
-              </a:schemeClr>
-            </a:solidFill>
-          </a:ln>
-          <a:extLst>
-            <a:ext uri="{909E8E84-426E-40DD-AFC4-6F175D3DCCD1}">
-              <a14:hiddenFill xmlns:a14="http://schemas.microsoft.com/office/drawing/2010/main">
-                <a:solidFill>
-                  <a:srgbClr val="FFFFFF"/>
-                </a:solidFill>
-              </a14:hiddenFill>
-            </a:ext>
-          </a:extLst>
-        </p:spPr>
-      </p:pic>
-      <p:sp>
-        <p:nvSpPr>
           <p:cNvPr id="4" name="Rectangle 3">
             <a:extLst>
               <a:ext uri="{FF2B5EF4-FFF2-40B4-BE49-F238E27FC236}">
@@ -14883,7 +14072,7 @@
         </p:nvSpPr>
         <p:spPr>
           <a:xfrm>
-            <a:off x="11272629" y="3719389"/>
+            <a:off x="11272629" y="4272276"/>
             <a:ext cx="919371" cy="430887"/>
           </a:xfrm>
           <a:prstGeom prst="rect">
@@ -15039,6 +14228,125 @@
           </a:p>
         </p:txBody>
       </p:sp>
+      <p:pic>
+        <p:nvPicPr>
+          <p:cNvPr id="8" name="Picture 7" descr="A screenshot of a computer screen&#10;&#10;Description automatically generated">
+            <a:extLst>
+              <a:ext uri="{FF2B5EF4-FFF2-40B4-BE49-F238E27FC236}">
+                <a16:creationId xmlns:a16="http://schemas.microsoft.com/office/drawing/2014/main" id="{56904CBA-AAE1-A730-3DF6-B360B5A4E08E}"/>
+              </a:ext>
+            </a:extLst>
+          </p:cNvPr>
+          <p:cNvPicPr>
+            <a:picLocks noChangeAspect="1"/>
+          </p:cNvPicPr>
+          <p:nvPr/>
+        </p:nvPicPr>
+        <p:blipFill>
+          <a:blip r:embed="rId2"/>
+          <a:stretch>
+            <a:fillRect/>
+          </a:stretch>
+        </p:blipFill>
+        <p:spPr>
+          <a:xfrm>
+            <a:off x="3715252" y="2713383"/>
+            <a:ext cx="3982720" cy="1558893"/>
+          </a:xfrm>
+          <a:prstGeom prst="rect">
+            <a:avLst/>
+          </a:prstGeom>
+        </p:spPr>
+      </p:pic>
+      <p:pic>
+        <p:nvPicPr>
+          <p:cNvPr id="12" name="Picture 11">
+            <a:extLst>
+              <a:ext uri="{FF2B5EF4-FFF2-40B4-BE49-F238E27FC236}">
+                <a16:creationId xmlns:a16="http://schemas.microsoft.com/office/drawing/2014/main" id="{C137A82A-F2DE-5F3F-7C2E-4E579C426B16}"/>
+              </a:ext>
+            </a:extLst>
+          </p:cNvPr>
+          <p:cNvPicPr>
+            <a:picLocks noChangeAspect="1"/>
+          </p:cNvPicPr>
+          <p:nvPr/>
+        </p:nvPicPr>
+        <p:blipFill rotWithShape="1">
+          <a:blip r:embed="rId3"/>
+          <a:srcRect t="9654" b="8208"/>
+          <a:stretch/>
+        </p:blipFill>
+        <p:spPr>
+          <a:xfrm>
+            <a:off x="3715252" y="2348680"/>
+            <a:ext cx="3982720" cy="292083"/>
+          </a:xfrm>
+          <a:prstGeom prst="rect">
+            <a:avLst/>
+          </a:prstGeom>
+        </p:spPr>
+      </p:pic>
+      <p:pic>
+        <p:nvPicPr>
+          <p:cNvPr id="14" name="Picture 13" descr="A screenshot of a computer screen&#10;&#10;Description automatically generated">
+            <a:extLst>
+              <a:ext uri="{FF2B5EF4-FFF2-40B4-BE49-F238E27FC236}">
+                <a16:creationId xmlns:a16="http://schemas.microsoft.com/office/drawing/2014/main" id="{F86F1BEB-ABD3-526F-97D6-9CD41CF4C103}"/>
+              </a:ext>
+            </a:extLst>
+          </p:cNvPr>
+          <p:cNvPicPr>
+            <a:picLocks noChangeAspect="1"/>
+          </p:cNvPicPr>
+          <p:nvPr/>
+        </p:nvPicPr>
+        <p:blipFill>
+          <a:blip r:embed="rId4"/>
+          <a:stretch>
+            <a:fillRect/>
+          </a:stretch>
+        </p:blipFill>
+        <p:spPr>
+          <a:xfrm>
+            <a:off x="3715252" y="4917676"/>
+            <a:ext cx="3982719" cy="1599278"/>
+          </a:xfrm>
+          <a:prstGeom prst="rect">
+            <a:avLst/>
+          </a:prstGeom>
+        </p:spPr>
+      </p:pic>
+      <p:pic>
+        <p:nvPicPr>
+          <p:cNvPr id="16" name="Picture 15">
+            <a:extLst>
+              <a:ext uri="{FF2B5EF4-FFF2-40B4-BE49-F238E27FC236}">
+                <a16:creationId xmlns:a16="http://schemas.microsoft.com/office/drawing/2014/main" id="{FAC14EA7-D2A5-0F3B-895C-7961C03F8DEE}"/>
+              </a:ext>
+            </a:extLst>
+          </p:cNvPr>
+          <p:cNvPicPr>
+            <a:picLocks noChangeAspect="1"/>
+          </p:cNvPicPr>
+          <p:nvPr/>
+        </p:nvPicPr>
+        <p:blipFill>
+          <a:blip r:embed="rId5"/>
+          <a:stretch>
+            <a:fillRect/>
+          </a:stretch>
+        </p:blipFill>
+        <p:spPr>
+          <a:xfrm>
+            <a:off x="3715252" y="4500213"/>
+            <a:ext cx="3982719" cy="330864"/>
+          </a:xfrm>
+          <a:prstGeom prst="rect">
+            <a:avLst/>
+          </a:prstGeom>
+        </p:spPr>
+      </p:pic>
     </p:spTree>
     <p:extLst>
       <p:ext uri="{BB962C8B-B14F-4D97-AF65-F5344CB8AC3E}">
@@ -15202,7 +14510,7 @@
         </p:nvSpPr>
         <p:spPr>
           <a:xfrm>
-            <a:off x="9273206" y="3327123"/>
+            <a:off x="9223662" y="4489471"/>
             <a:ext cx="1699591" cy="427383"/>
           </a:xfrm>
           <a:prstGeom prst="rect">
@@ -15413,335 +14721,16 @@
               <a:rPr lang="he-IL" dirty="0"/>
               <a:t>2 שניות:</a:t>
             </a:r>
-            <a:endParaRPr lang="en-IL"/>
-          </a:p>
-        </p:txBody>
-      </p:sp>
-      <p:sp>
-        <p:nvSpPr>
-          <p:cNvPr id="11" name="Content Placeholder 2">
-            <a:extLst>
-              <a:ext uri="{FF2B5EF4-FFF2-40B4-BE49-F238E27FC236}">
-                <a16:creationId xmlns:a16="http://schemas.microsoft.com/office/drawing/2014/main" id="{BD323D73-D934-3B8A-97D9-1525641968EE}"/>
-              </a:ext>
-            </a:extLst>
-          </p:cNvPr>
-          <p:cNvSpPr txBox="1">
-            <a:spLocks/>
-          </p:cNvSpPr>
-          <p:nvPr/>
-        </p:nvSpPr>
-        <p:spPr>
-          <a:xfrm>
-            <a:off x="9273206" y="4368246"/>
-            <a:ext cx="1699591" cy="427383"/>
-          </a:xfrm>
-          <a:prstGeom prst="rect">
-            <a:avLst/>
-          </a:prstGeom>
-        </p:spPr>
-        <p:txBody>
-          <a:bodyPr vert="horz" lIns="91440" tIns="45720" rIns="91440" bIns="45720" rtlCol="0">
-            <a:normAutofit/>
-          </a:bodyPr>
-          <a:lstStyle>
-            <a:lvl1pPr marL="384048" indent="-384048" algn="l" defTabSz="914400" rtl="0" eaLnBrk="1" latinLnBrk="0" hangingPunct="1">
-              <a:lnSpc>
-                <a:spcPct val="94000"/>
-              </a:lnSpc>
-              <a:spcBef>
-                <a:spcPts val="1000"/>
-              </a:spcBef>
-              <a:spcAft>
-                <a:spcPts val="200"/>
-              </a:spcAft>
-              <a:buFont typeface="Franklin Gothic Book" panose="020B0503020102020204" pitchFamily="34" charset="0"/>
-              <a:buChar char="■"/>
-              <a:defRPr sz="2000" kern="1200" baseline="0">
-                <a:solidFill>
-                  <a:schemeClr val="tx2"/>
-                </a:solidFill>
-                <a:latin typeface="+mn-lt"/>
-                <a:ea typeface="+mn-ea"/>
-                <a:cs typeface="+mn-cs"/>
-              </a:defRPr>
-            </a:lvl1pPr>
-            <a:lvl2pPr marL="914400" indent="-384048" algn="l" defTabSz="914400" rtl="0" eaLnBrk="1" latinLnBrk="0" hangingPunct="1">
-              <a:lnSpc>
-                <a:spcPct val="94000"/>
-              </a:lnSpc>
-              <a:spcBef>
-                <a:spcPts val="500"/>
-              </a:spcBef>
-              <a:spcAft>
-                <a:spcPts val="200"/>
-              </a:spcAft>
-              <a:buFont typeface="Franklin Gothic Book" panose="020B0503020102020204" pitchFamily="34" charset="0"/>
-              <a:buChar char="–"/>
-              <a:defRPr sz="2000" i="1" kern="1200" baseline="0">
-                <a:solidFill>
-                  <a:schemeClr val="tx2"/>
-                </a:solidFill>
-                <a:latin typeface="+mn-lt"/>
-                <a:ea typeface="+mn-ea"/>
-                <a:cs typeface="+mn-cs"/>
-              </a:defRPr>
-            </a:lvl2pPr>
-            <a:lvl3pPr marL="1371600" indent="-384048" algn="l" defTabSz="914400" rtl="0" eaLnBrk="1" latinLnBrk="0" hangingPunct="1">
-              <a:lnSpc>
-                <a:spcPct val="94000"/>
-              </a:lnSpc>
-              <a:spcBef>
-                <a:spcPts val="500"/>
-              </a:spcBef>
-              <a:spcAft>
-                <a:spcPts val="200"/>
-              </a:spcAft>
-              <a:buFont typeface="Franklin Gothic Book" panose="020B0503020102020204" pitchFamily="34" charset="0"/>
-              <a:buChar char="■"/>
-              <a:defRPr sz="1800" kern="1200" baseline="0">
-                <a:solidFill>
-                  <a:schemeClr val="tx2"/>
-                </a:solidFill>
-                <a:latin typeface="+mn-lt"/>
-                <a:ea typeface="+mn-ea"/>
-                <a:cs typeface="+mn-cs"/>
-              </a:defRPr>
-            </a:lvl3pPr>
-            <a:lvl4pPr marL="1828800" indent="-384048" algn="l" defTabSz="914400" rtl="0" eaLnBrk="1" latinLnBrk="0" hangingPunct="1">
-              <a:lnSpc>
-                <a:spcPct val="94000"/>
-              </a:lnSpc>
-              <a:spcBef>
-                <a:spcPts val="500"/>
-              </a:spcBef>
-              <a:spcAft>
-                <a:spcPts val="200"/>
-              </a:spcAft>
-              <a:buFont typeface="Franklin Gothic Book" panose="020B0503020102020204" pitchFamily="34" charset="0"/>
-              <a:buChar char="–"/>
-              <a:defRPr sz="1800" i="1" kern="1200" baseline="0">
-                <a:solidFill>
-                  <a:schemeClr val="tx2"/>
-                </a:solidFill>
-                <a:latin typeface="+mn-lt"/>
-                <a:ea typeface="+mn-ea"/>
-                <a:cs typeface="+mn-cs"/>
-              </a:defRPr>
-            </a:lvl4pPr>
-            <a:lvl5pPr marL="2286000" indent="-384048" algn="l" defTabSz="914400" rtl="0" eaLnBrk="1" latinLnBrk="0" hangingPunct="1">
-              <a:lnSpc>
-                <a:spcPct val="94000"/>
-              </a:lnSpc>
-              <a:spcBef>
-                <a:spcPts val="500"/>
-              </a:spcBef>
-              <a:spcAft>
-                <a:spcPts val="200"/>
-              </a:spcAft>
-              <a:buFont typeface="Franklin Gothic Book" panose="020B0503020102020204" pitchFamily="34" charset="0"/>
-              <a:buChar char="■"/>
-              <a:defRPr sz="1600" kern="1200" baseline="0">
-                <a:solidFill>
-                  <a:schemeClr val="tx2"/>
-                </a:solidFill>
-                <a:latin typeface="+mn-lt"/>
-                <a:ea typeface="+mn-ea"/>
-                <a:cs typeface="+mn-cs"/>
-              </a:defRPr>
-            </a:lvl5pPr>
-            <a:lvl6pPr marL="2743200" indent="-384048" algn="l" defTabSz="914400" rtl="0" eaLnBrk="1" latinLnBrk="0" hangingPunct="1">
-              <a:lnSpc>
-                <a:spcPct val="94000"/>
-              </a:lnSpc>
-              <a:spcBef>
-                <a:spcPts val="500"/>
-              </a:spcBef>
-              <a:spcAft>
-                <a:spcPts val="200"/>
-              </a:spcAft>
-              <a:buFont typeface="Franklin Gothic Book" panose="020B0503020102020204" pitchFamily="34" charset="0"/>
-              <a:buChar char="–"/>
-              <a:defRPr sz="1600" i="1" kern="1200" baseline="0">
-                <a:solidFill>
-                  <a:schemeClr val="tx2"/>
-                </a:solidFill>
-                <a:latin typeface="+mn-lt"/>
-                <a:ea typeface="+mn-ea"/>
-                <a:cs typeface="+mn-cs"/>
-              </a:defRPr>
-            </a:lvl6pPr>
-            <a:lvl7pPr marL="3200400" indent="-384048" algn="l" defTabSz="914400" rtl="0" eaLnBrk="1" latinLnBrk="0" hangingPunct="1">
-              <a:lnSpc>
-                <a:spcPct val="94000"/>
-              </a:lnSpc>
-              <a:spcBef>
-                <a:spcPts val="500"/>
-              </a:spcBef>
-              <a:spcAft>
-                <a:spcPts val="200"/>
-              </a:spcAft>
-              <a:buFont typeface="Franklin Gothic Book" panose="020B0503020102020204" pitchFamily="34" charset="0"/>
-              <a:buChar char="■"/>
-              <a:defRPr sz="1400" kern="1200" baseline="0">
-                <a:solidFill>
-                  <a:schemeClr val="tx2"/>
-                </a:solidFill>
-                <a:latin typeface="+mn-lt"/>
-                <a:ea typeface="+mn-ea"/>
-                <a:cs typeface="+mn-cs"/>
-              </a:defRPr>
-            </a:lvl7pPr>
-            <a:lvl8pPr marL="3657600" indent="-384048" algn="l" defTabSz="914400" rtl="0" eaLnBrk="1" latinLnBrk="0" hangingPunct="1">
-              <a:lnSpc>
-                <a:spcPct val="94000"/>
-              </a:lnSpc>
-              <a:spcBef>
-                <a:spcPts val="500"/>
-              </a:spcBef>
-              <a:spcAft>
-                <a:spcPts val="200"/>
-              </a:spcAft>
-              <a:buFont typeface="Franklin Gothic Book" panose="020B0503020102020204" pitchFamily="34" charset="0"/>
-              <a:buChar char="–"/>
-              <a:defRPr sz="1400" i="1" kern="1200" baseline="0">
-                <a:solidFill>
-                  <a:schemeClr val="tx2"/>
-                </a:solidFill>
-                <a:latin typeface="+mn-lt"/>
-                <a:ea typeface="+mn-ea"/>
-                <a:cs typeface="+mn-cs"/>
-              </a:defRPr>
-            </a:lvl8pPr>
-            <a:lvl9pPr marL="4114800" indent="-384048" algn="l" defTabSz="914400" rtl="0" eaLnBrk="1" latinLnBrk="0" hangingPunct="1">
-              <a:lnSpc>
-                <a:spcPct val="94000"/>
-              </a:lnSpc>
-              <a:spcBef>
-                <a:spcPts val="500"/>
-              </a:spcBef>
-              <a:spcAft>
-                <a:spcPts val="200"/>
-              </a:spcAft>
-              <a:buFont typeface="Franklin Gothic Book" panose="020B0503020102020204" pitchFamily="34" charset="0"/>
-              <a:buChar char="■"/>
-              <a:defRPr sz="1400" kern="1200" baseline="0">
-                <a:solidFill>
-                  <a:schemeClr val="tx2"/>
-                </a:solidFill>
-                <a:latin typeface="+mn-lt"/>
-                <a:ea typeface="+mn-ea"/>
-                <a:cs typeface="+mn-cs"/>
-              </a:defRPr>
-            </a:lvl9pPr>
-          </a:lstStyle>
-          <a:p>
-            <a:pPr algn="r" rtl="1">
-              <a:buFont typeface="Courier New" panose="02070309020205020404" pitchFamily="49" charset="0"/>
-              <a:buChar char="o"/>
-            </a:pPr>
-            <a:r>
-              <a:rPr lang="he-IL" dirty="0"/>
-              <a:t>3 שניות:</a:t>
-            </a:r>
-            <a:endParaRPr lang="en-IL"/>
-          </a:p>
-        </p:txBody>
-      </p:sp>
-      <p:pic>
-        <p:nvPicPr>
-          <p:cNvPr id="4" name="Picture 3" descr="A number on a black background&#10;&#10;Description automatically generated">
-            <a:extLst>
-              <a:ext uri="{FF2B5EF4-FFF2-40B4-BE49-F238E27FC236}">
-                <a16:creationId xmlns:a16="http://schemas.microsoft.com/office/drawing/2014/main" id="{87286C74-4103-B752-9440-014D318D4F47}"/>
-              </a:ext>
-            </a:extLst>
-          </p:cNvPr>
-          <p:cNvPicPr>
-            <a:picLocks noChangeAspect="1"/>
-          </p:cNvPicPr>
-          <p:nvPr/>
-        </p:nvPicPr>
-        <p:blipFill rotWithShape="1">
-          <a:blip r:embed="rId2"/>
-          <a:srcRect t="15144" b="4526"/>
-          <a:stretch/>
-        </p:blipFill>
-        <p:spPr>
-          <a:xfrm>
-            <a:off x="3736589" y="2796045"/>
-            <a:ext cx="4718819" cy="438477"/>
-          </a:xfrm>
-          <a:prstGeom prst="rect">
-            <a:avLst/>
-          </a:prstGeom>
-        </p:spPr>
-      </p:pic>
-      <p:pic>
-        <p:nvPicPr>
-          <p:cNvPr id="9" name="Picture 8" descr="A black background with white numbers&#10;&#10;Description automatically generated">
-            <a:extLst>
-              <a:ext uri="{FF2B5EF4-FFF2-40B4-BE49-F238E27FC236}">
-                <a16:creationId xmlns:a16="http://schemas.microsoft.com/office/drawing/2014/main" id="{047E1099-D577-07F0-8264-124715A1F0E6}"/>
-              </a:ext>
-            </a:extLst>
-          </p:cNvPr>
-          <p:cNvPicPr>
-            <a:picLocks noChangeAspect="1"/>
-          </p:cNvPicPr>
-          <p:nvPr/>
-        </p:nvPicPr>
-        <p:blipFill>
-          <a:blip r:embed="rId3"/>
-          <a:stretch>
-            <a:fillRect/>
-          </a:stretch>
-        </p:blipFill>
-        <p:spPr>
-          <a:xfrm>
-            <a:off x="3736589" y="3754506"/>
-            <a:ext cx="4718820" cy="502919"/>
-          </a:xfrm>
-          <a:prstGeom prst="rect">
-            <a:avLst/>
-          </a:prstGeom>
-        </p:spPr>
-      </p:pic>
-      <p:pic>
-        <p:nvPicPr>
-          <p:cNvPr id="14" name="Picture 13" descr="A screenshot of a phone&#10;&#10;Description automatically generated">
-            <a:extLst>
-              <a:ext uri="{FF2B5EF4-FFF2-40B4-BE49-F238E27FC236}">
-                <a16:creationId xmlns:a16="http://schemas.microsoft.com/office/drawing/2014/main" id="{C6E9336B-29EF-1DB4-55E8-B957DBBDE1F7}"/>
-              </a:ext>
-            </a:extLst>
-          </p:cNvPr>
-          <p:cNvPicPr>
-            <a:picLocks noChangeAspect="1"/>
-          </p:cNvPicPr>
-          <p:nvPr/>
-        </p:nvPicPr>
-        <p:blipFill rotWithShape="1">
-          <a:blip r:embed="rId4"/>
-          <a:srcRect t="16716"/>
-          <a:stretch/>
-        </p:blipFill>
-        <p:spPr>
-          <a:xfrm>
-            <a:off x="3736589" y="4777409"/>
-            <a:ext cx="4718820" cy="499417"/>
-          </a:xfrm>
-          <a:prstGeom prst="rect">
-            <a:avLst/>
-          </a:prstGeom>
-        </p:spPr>
-      </p:pic>
-      <p:sp>
-        <p:nvSpPr>
-          <p:cNvPr id="8" name="Right Brace 7">
-            <a:extLst>
-              <a:ext uri="{FF2B5EF4-FFF2-40B4-BE49-F238E27FC236}">
-                <a16:creationId xmlns:a16="http://schemas.microsoft.com/office/drawing/2014/main" id="{713E744E-4295-C7C8-781B-30BBB24AB25C}"/>
+            <a:endParaRPr lang="en-IL" dirty="0"/>
+          </a:p>
+        </p:txBody>
+      </p:sp>
+      <p:sp>
+        <p:nvSpPr>
+          <p:cNvPr id="5" name="Right Brace 4">
+            <a:extLst>
+              <a:ext uri="{FF2B5EF4-FFF2-40B4-BE49-F238E27FC236}">
+                <a16:creationId xmlns:a16="http://schemas.microsoft.com/office/drawing/2014/main" id="{C2FE43AA-509A-F6B2-15B8-F937E87ED49E}"/>
               </a:ext>
             </a:extLst>
           </p:cNvPr>
@@ -15751,7 +14740,7 @@
         <p:spPr>
           <a:xfrm>
             <a:off x="10923253" y="2314966"/>
-            <a:ext cx="457200" cy="3197560"/>
+            <a:ext cx="457200" cy="4309354"/>
           </a:xfrm>
           <a:prstGeom prst="rightBrace">
             <a:avLst/>
@@ -15782,10 +14771,10 @@
       </p:sp>
       <p:sp>
         <p:nvSpPr>
-          <p:cNvPr id="2" name="Rectangle 1">
-            <a:extLst>
-              <a:ext uri="{FF2B5EF4-FFF2-40B4-BE49-F238E27FC236}">
-                <a16:creationId xmlns:a16="http://schemas.microsoft.com/office/drawing/2014/main" id="{1865F5DA-3326-3C8D-E60F-1DF6039F0D14}"/>
+          <p:cNvPr id="7" name="Rectangle 6">
+            <a:extLst>
+              <a:ext uri="{FF2B5EF4-FFF2-40B4-BE49-F238E27FC236}">
+                <a16:creationId xmlns:a16="http://schemas.microsoft.com/office/drawing/2014/main" id="{5C2342C3-85E2-6BA9-A11B-EA74A79ECA27}"/>
               </a:ext>
             </a:extLst>
           </p:cNvPr>
@@ -15794,7 +14783,7 @@
         </p:nvSpPr>
         <p:spPr>
           <a:xfrm>
-            <a:off x="11272629" y="3719389"/>
+            <a:off x="11272629" y="4272276"/>
             <a:ext cx="919371" cy="430887"/>
           </a:xfrm>
           <a:prstGeom prst="rect">
@@ -15950,6 +14939,126 @@
           </a:p>
         </p:txBody>
       </p:sp>
+      <p:pic>
+        <p:nvPicPr>
+          <p:cNvPr id="8" name="Picture 7">
+            <a:extLst>
+              <a:ext uri="{FF2B5EF4-FFF2-40B4-BE49-F238E27FC236}">
+                <a16:creationId xmlns:a16="http://schemas.microsoft.com/office/drawing/2014/main" id="{979068AF-B147-8060-8A4D-954497CEF777}"/>
+              </a:ext>
+            </a:extLst>
+          </p:cNvPr>
+          <p:cNvPicPr>
+            <a:picLocks noChangeAspect="1"/>
+          </p:cNvPicPr>
+          <p:nvPr/>
+        </p:nvPicPr>
+        <p:blipFill>
+          <a:blip r:embed="rId2"/>
+          <a:stretch>
+            <a:fillRect/>
+          </a:stretch>
+        </p:blipFill>
+        <p:spPr>
+          <a:xfrm>
+            <a:off x="3715251" y="2316620"/>
+            <a:ext cx="3982719" cy="307178"/>
+          </a:xfrm>
+          <a:prstGeom prst="rect">
+            <a:avLst/>
+          </a:prstGeom>
+        </p:spPr>
+      </p:pic>
+      <p:pic>
+        <p:nvPicPr>
+          <p:cNvPr id="9" name="Picture 8" descr="A screenshot of a black screen&#10;&#10;Description automatically generated">
+            <a:extLst>
+              <a:ext uri="{FF2B5EF4-FFF2-40B4-BE49-F238E27FC236}">
+                <a16:creationId xmlns:a16="http://schemas.microsoft.com/office/drawing/2014/main" id="{5FD43A9F-BDCB-05E8-265D-4B0EE25D17CB}"/>
+              </a:ext>
+            </a:extLst>
+          </p:cNvPr>
+          <p:cNvPicPr>
+            <a:picLocks noChangeAspect="1"/>
+          </p:cNvPicPr>
+          <p:nvPr/>
+        </p:nvPicPr>
+        <p:blipFill>
+          <a:blip r:embed="rId3"/>
+          <a:stretch>
+            <a:fillRect/>
+          </a:stretch>
+        </p:blipFill>
+        <p:spPr>
+          <a:xfrm>
+            <a:off x="3715250" y="2710397"/>
+            <a:ext cx="3982719" cy="1632094"/>
+          </a:xfrm>
+          <a:prstGeom prst="rect">
+            <a:avLst/>
+          </a:prstGeom>
+        </p:spPr>
+      </p:pic>
+      <p:pic>
+        <p:nvPicPr>
+          <p:cNvPr id="12" name="Picture 11">
+            <a:extLst>
+              <a:ext uri="{FF2B5EF4-FFF2-40B4-BE49-F238E27FC236}">
+                <a16:creationId xmlns:a16="http://schemas.microsoft.com/office/drawing/2014/main" id="{2F83D1EF-F8F8-1AE1-505F-1039B556F726}"/>
+              </a:ext>
+            </a:extLst>
+          </p:cNvPr>
+          <p:cNvPicPr>
+            <a:picLocks noChangeAspect="1"/>
+          </p:cNvPicPr>
+          <p:nvPr/>
+        </p:nvPicPr>
+        <p:blipFill>
+          <a:blip r:embed="rId4"/>
+          <a:stretch>
+            <a:fillRect/>
+          </a:stretch>
+        </p:blipFill>
+        <p:spPr>
+          <a:xfrm>
+            <a:off x="3715249" y="4520765"/>
+            <a:ext cx="3982719" cy="327491"/>
+          </a:xfrm>
+          <a:prstGeom prst="rect">
+            <a:avLst/>
+          </a:prstGeom>
+        </p:spPr>
+      </p:pic>
+      <p:pic>
+        <p:nvPicPr>
+          <p:cNvPr id="14" name="Picture 13" descr="A screenshot of a computer screen&#10;&#10;Description automatically generated">
+            <a:extLst>
+              <a:ext uri="{FF2B5EF4-FFF2-40B4-BE49-F238E27FC236}">
+                <a16:creationId xmlns:a16="http://schemas.microsoft.com/office/drawing/2014/main" id="{93EC94BC-5A76-A0C3-81D1-6C70D7542229}"/>
+              </a:ext>
+            </a:extLst>
+          </p:cNvPr>
+          <p:cNvPicPr>
+            <a:picLocks noChangeAspect="1"/>
+          </p:cNvPicPr>
+          <p:nvPr/>
+        </p:nvPicPr>
+        <p:blipFill>
+          <a:blip r:embed="rId5"/>
+          <a:stretch>
+            <a:fillRect/>
+          </a:stretch>
+        </p:blipFill>
+        <p:spPr>
+          <a:xfrm>
+            <a:off x="3715248" y="4927014"/>
+            <a:ext cx="3982719" cy="1574563"/>
+          </a:xfrm>
+          <a:prstGeom prst="rect">
+            <a:avLst/>
+          </a:prstGeom>
+        </p:spPr>
+      </p:pic>
     </p:spTree>
     <p:extLst>
       <p:ext uri="{BB962C8B-B14F-4D97-AF65-F5344CB8AC3E}">
@@ -16229,14 +15338,6 @@
             <a:r>
               <a:rPr lang="he-IL" dirty="0"/>
               <a:t>סינון על פי כמות פאקטות: 50 / 100 / 150</a:t>
-            </a:r>
-            <a:r>
-              <a:rPr lang="en-US" dirty="0"/>
-              <a:t> </a:t>
-            </a:r>
-            <a:r>
-              <a:rPr lang="he-IL" dirty="0"/>
-              <a:t>/ 200</a:t>
             </a:r>
             <a:r>
               <a:rPr lang="en-US" dirty="0"/>

</xml_diff>